<commit_message>
apply Stephen's comments to the coverage paper
</commit_message>
<xml_diff>
--- a/completeness/completeness_TEX/figs/figs.pptx
+++ b/completeness/completeness_TEX/figs/figs.pptx
@@ -7,8 +7,9 @@
   <p:sldIdLst>
     <p:sldId id="256" r:id="rId2"/>
     <p:sldId id="257" r:id="rId3"/>
-    <p:sldId id="258" r:id="rId4"/>
-    <p:sldId id="259" r:id="rId5"/>
+    <p:sldId id="260" r:id="rId4"/>
+    <p:sldId id="258" r:id="rId5"/>
+    <p:sldId id="259" r:id="rId6"/>
   </p:sldIdLst>
   <p:sldSz cx="12192000" cy="6858000"/>
   <p:notesSz cx="6858000" cy="9144000"/>
@@ -246,7 +247,7 @@
           <a:p>
             <a:fld id="{5A779009-EA30-43A9-A43B-F006CC3D9B84}" type="datetimeFigureOut">
               <a:rPr lang="en-US" smtClean="0"/>
-              <a:t>8/25/2016</a:t>
+              <a:t>1/22/2017</a:t>
             </a:fld>
             <a:endParaRPr lang="en-US"/>
           </a:p>
@@ -416,7 +417,7 @@
           <a:p>
             <a:fld id="{5A779009-EA30-43A9-A43B-F006CC3D9B84}" type="datetimeFigureOut">
               <a:rPr lang="en-US" smtClean="0"/>
-              <a:t>8/25/2016</a:t>
+              <a:t>1/22/2017</a:t>
             </a:fld>
             <a:endParaRPr lang="en-US"/>
           </a:p>
@@ -596,7 +597,7 @@
           <a:p>
             <a:fld id="{5A779009-EA30-43A9-A43B-F006CC3D9B84}" type="datetimeFigureOut">
               <a:rPr lang="en-US" smtClean="0"/>
-              <a:t>8/25/2016</a:t>
+              <a:t>1/22/2017</a:t>
             </a:fld>
             <a:endParaRPr lang="en-US"/>
           </a:p>
@@ -766,7 +767,7 @@
           <a:p>
             <a:fld id="{5A779009-EA30-43A9-A43B-F006CC3D9B84}" type="datetimeFigureOut">
               <a:rPr lang="en-US" smtClean="0"/>
-              <a:t>8/25/2016</a:t>
+              <a:t>1/22/2017</a:t>
             </a:fld>
             <a:endParaRPr lang="en-US"/>
           </a:p>
@@ -1012,7 +1013,7 @@
           <a:p>
             <a:fld id="{5A779009-EA30-43A9-A43B-F006CC3D9B84}" type="datetimeFigureOut">
               <a:rPr lang="en-US" smtClean="0"/>
-              <a:t>8/25/2016</a:t>
+              <a:t>1/22/2017</a:t>
             </a:fld>
             <a:endParaRPr lang="en-US"/>
           </a:p>
@@ -1244,7 +1245,7 @@
           <a:p>
             <a:fld id="{5A779009-EA30-43A9-A43B-F006CC3D9B84}" type="datetimeFigureOut">
               <a:rPr lang="en-US" smtClean="0"/>
-              <a:t>8/25/2016</a:t>
+              <a:t>1/22/2017</a:t>
             </a:fld>
             <a:endParaRPr lang="en-US"/>
           </a:p>
@@ -1611,7 +1612,7 @@
           <a:p>
             <a:fld id="{5A779009-EA30-43A9-A43B-F006CC3D9B84}" type="datetimeFigureOut">
               <a:rPr lang="en-US" smtClean="0"/>
-              <a:t>8/25/2016</a:t>
+              <a:t>1/22/2017</a:t>
             </a:fld>
             <a:endParaRPr lang="en-US"/>
           </a:p>
@@ -1729,7 +1730,7 @@
           <a:p>
             <a:fld id="{5A779009-EA30-43A9-A43B-F006CC3D9B84}" type="datetimeFigureOut">
               <a:rPr lang="en-US" smtClean="0"/>
-              <a:t>8/25/2016</a:t>
+              <a:t>1/22/2017</a:t>
             </a:fld>
             <a:endParaRPr lang="en-US"/>
           </a:p>
@@ -1824,7 +1825,7 @@
           <a:p>
             <a:fld id="{5A779009-EA30-43A9-A43B-F006CC3D9B84}" type="datetimeFigureOut">
               <a:rPr lang="en-US" smtClean="0"/>
-              <a:t>8/25/2016</a:t>
+              <a:t>1/22/2017</a:t>
             </a:fld>
             <a:endParaRPr lang="en-US"/>
           </a:p>
@@ -2101,7 +2102,7 @@
           <a:p>
             <a:fld id="{5A779009-EA30-43A9-A43B-F006CC3D9B84}" type="datetimeFigureOut">
               <a:rPr lang="en-US" smtClean="0"/>
-              <a:t>8/25/2016</a:t>
+              <a:t>1/22/2017</a:t>
             </a:fld>
             <a:endParaRPr lang="en-US"/>
           </a:p>
@@ -2354,7 +2355,7 @@
           <a:p>
             <a:fld id="{5A779009-EA30-43A9-A43B-F006CC3D9B84}" type="datetimeFigureOut">
               <a:rPr lang="en-US" smtClean="0"/>
-              <a:t>8/25/2016</a:t>
+              <a:t>1/22/2017</a:t>
             </a:fld>
             <a:endParaRPr lang="en-US"/>
           </a:p>
@@ -2567,7 +2568,7 @@
           <a:p>
             <a:fld id="{5A779009-EA30-43A9-A43B-F006CC3D9B84}" type="datetimeFigureOut">
               <a:rPr lang="en-US" smtClean="0"/>
-              <a:t>8/25/2016</a:t>
+              <a:t>1/22/2017</a:t>
             </a:fld>
             <a:endParaRPr lang="en-US"/>
           </a:p>
@@ -4292,6 +4293,1011 @@
 </file>
 
 <file path=ppt/slides/slide3.xml><?xml version="1.0" encoding="utf-8"?>
+<p:sld xmlns:a="http://schemas.openxmlformats.org/drawingml/2006/main" xmlns:r="http://schemas.openxmlformats.org/officeDocument/2006/relationships" xmlns:p="http://schemas.openxmlformats.org/presentationml/2006/main">
+  <p:cSld>
+    <p:spTree>
+      <p:nvGrpSpPr>
+        <p:cNvPr id="1" name=""/>
+        <p:cNvGrpSpPr/>
+        <p:nvPr/>
+      </p:nvGrpSpPr>
+      <p:grpSpPr>
+        <a:xfrm>
+          <a:off x="0" y="0"/>
+          <a:ext cx="0" cy="0"/>
+          <a:chOff x="0" y="0"/>
+          <a:chExt cx="0" cy="0"/>
+        </a:xfrm>
+      </p:grpSpPr>
+      <p:sp>
+        <p:nvSpPr>
+          <p:cNvPr id="3" name="Content Placeholder 2"/>
+          <p:cNvSpPr>
+            <a:spLocks noGrp="1"/>
+          </p:cNvSpPr>
+          <p:nvPr>
+            <p:ph idx="1"/>
+          </p:nvPr>
+        </p:nvSpPr>
+        <p:spPr>
+          <a:xfrm>
+            <a:off x="838200" y="577970"/>
+            <a:ext cx="6640902" cy="6219645"/>
+          </a:xfrm>
+        </p:spPr>
+        <p:txBody>
+          <a:bodyPr>
+            <a:noAutofit/>
+          </a:bodyPr>
+          <a:lstStyle/>
+          <a:p>
+            <a:pPr marL="0" indent="0">
+              <a:buNone/>
+            </a:pPr>
+            <a:r>
+              <a:rPr lang="en-US" sz="1600" b="1" dirty="0">
+                <a:latin typeface="Courier New" panose="02070309020205020404" pitchFamily="49" charset="0"/>
+                <a:cs typeface="Courier New" panose="02070309020205020404" pitchFamily="49" charset="0"/>
+              </a:rPr>
+              <a:t>node</a:t>
+            </a:r>
+            <a:r>
+              <a:rPr lang="en-US" sz="1600" dirty="0">
+                <a:latin typeface="Courier New" panose="02070309020205020404" pitchFamily="49" charset="0"/>
+                <a:cs typeface="Courier New" panose="02070309020205020404" pitchFamily="49" charset="0"/>
+              </a:rPr>
+              <a:t> </a:t>
+            </a:r>
+            <a:r>
+              <a:rPr lang="en-US" sz="1600" dirty="0" err="1">
+                <a:latin typeface="Courier New" panose="02070309020205020404" pitchFamily="49" charset="0"/>
+                <a:cs typeface="Courier New" panose="02070309020205020404" pitchFamily="49" charset="0"/>
+              </a:rPr>
+              <a:t>asw</a:t>
+            </a:r>
+            <a:r>
+              <a:rPr lang="en-US" sz="1600" dirty="0">
+                <a:latin typeface="Courier New" panose="02070309020205020404" pitchFamily="49" charset="0"/>
+                <a:cs typeface="Courier New" panose="02070309020205020404" pitchFamily="49" charset="0"/>
+              </a:rPr>
+              <a:t>(alt1, alt2: </a:t>
+            </a:r>
+            <a:r>
+              <a:rPr lang="en-US" sz="1600" b="1" dirty="0" err="1">
+                <a:latin typeface="Courier New" panose="02070309020205020404" pitchFamily="49" charset="0"/>
+                <a:cs typeface="Courier New" panose="02070309020205020404" pitchFamily="49" charset="0"/>
+              </a:rPr>
+              <a:t>int</a:t>
+            </a:r>
+            <a:r>
+              <a:rPr lang="en-US" sz="1600" dirty="0">
+                <a:latin typeface="Courier New" panose="02070309020205020404" pitchFamily="49" charset="0"/>
+                <a:cs typeface="Courier New" panose="02070309020205020404" pitchFamily="49" charset="0"/>
+              </a:rPr>
+              <a:t>; inhibit: </a:t>
+            </a:r>
+            <a:r>
+              <a:rPr lang="en-US" sz="1600" b="1" dirty="0">
+                <a:latin typeface="Courier New" panose="02070309020205020404" pitchFamily="49" charset="0"/>
+                <a:cs typeface="Courier New" panose="02070309020205020404" pitchFamily="49" charset="0"/>
+              </a:rPr>
+              <a:t>bool</a:t>
+            </a:r>
+            <a:r>
+              <a:rPr lang="en-US" sz="1600" dirty="0">
+                <a:latin typeface="Courier New" panose="02070309020205020404" pitchFamily="49" charset="0"/>
+                <a:cs typeface="Courier New" panose="02070309020205020404" pitchFamily="49" charset="0"/>
+              </a:rPr>
+              <a:t>)</a:t>
+            </a:r>
+          </a:p>
+          <a:p>
+            <a:pPr marL="0" indent="0">
+              <a:buNone/>
+            </a:pPr>
+            <a:r>
+              <a:rPr lang="en-US" sz="1600" dirty="0">
+                <a:latin typeface="Courier New" panose="02070309020205020404" pitchFamily="49" charset="0"/>
+                <a:cs typeface="Courier New" panose="02070309020205020404" pitchFamily="49" charset="0"/>
+              </a:rPr>
+              <a:t> </a:t>
+            </a:r>
+            <a:r>
+              <a:rPr lang="en-US" sz="1600" dirty="0" smtClean="0">
+                <a:latin typeface="Courier New" panose="02070309020205020404" pitchFamily="49" charset="0"/>
+                <a:cs typeface="Courier New" panose="02070309020205020404" pitchFamily="49" charset="0"/>
+              </a:rPr>
+              <a:t>    </a:t>
+            </a:r>
+            <a:r>
+              <a:rPr lang="en-US" sz="1600" b="1" dirty="0" smtClean="0">
+                <a:latin typeface="Courier New" panose="02070309020205020404" pitchFamily="49" charset="0"/>
+                <a:cs typeface="Courier New" panose="02070309020205020404" pitchFamily="49" charset="0"/>
+              </a:rPr>
+              <a:t>returns</a:t>
+            </a:r>
+            <a:r>
+              <a:rPr lang="en-US" sz="1600" dirty="0" smtClean="0">
+                <a:latin typeface="Courier New" panose="02070309020205020404" pitchFamily="49" charset="0"/>
+                <a:cs typeface="Courier New" panose="02070309020205020404" pitchFamily="49" charset="0"/>
+              </a:rPr>
+              <a:t> </a:t>
+            </a:r>
+            <a:r>
+              <a:rPr lang="en-US" sz="1600" dirty="0">
+                <a:latin typeface="Courier New" panose="02070309020205020404" pitchFamily="49" charset="0"/>
+                <a:cs typeface="Courier New" panose="02070309020205020404" pitchFamily="49" charset="0"/>
+              </a:rPr>
+              <a:t>(</a:t>
+            </a:r>
+            <a:r>
+              <a:rPr lang="en-US" sz="1600" dirty="0" err="1">
+                <a:latin typeface="Courier New" panose="02070309020205020404" pitchFamily="49" charset="0"/>
+                <a:cs typeface="Courier New" panose="02070309020205020404" pitchFamily="49" charset="0"/>
+              </a:rPr>
+              <a:t>doi_on</a:t>
+            </a:r>
+            <a:r>
+              <a:rPr lang="en-US" sz="1600" dirty="0">
+                <a:latin typeface="Courier New" panose="02070309020205020404" pitchFamily="49" charset="0"/>
+                <a:cs typeface="Courier New" panose="02070309020205020404" pitchFamily="49" charset="0"/>
+              </a:rPr>
+              <a:t>: </a:t>
+            </a:r>
+            <a:r>
+              <a:rPr lang="en-US" sz="1600" b="1" dirty="0">
+                <a:latin typeface="Courier New" panose="02070309020205020404" pitchFamily="49" charset="0"/>
+                <a:cs typeface="Courier New" panose="02070309020205020404" pitchFamily="49" charset="0"/>
+              </a:rPr>
+              <a:t>bool</a:t>
+            </a:r>
+            <a:r>
+              <a:rPr lang="en-US" sz="1600" dirty="0">
+                <a:latin typeface="Courier New" panose="02070309020205020404" pitchFamily="49" charset="0"/>
+                <a:cs typeface="Courier New" panose="02070309020205020404" pitchFamily="49" charset="0"/>
+              </a:rPr>
+              <a:t>);</a:t>
+            </a:r>
+          </a:p>
+          <a:p>
+            <a:pPr marL="0" indent="0">
+              <a:buNone/>
+            </a:pPr>
+            <a:r>
+              <a:rPr lang="en-US" sz="1600" dirty="0" smtClean="0">
+                <a:latin typeface="Courier New" panose="02070309020205020404" pitchFamily="49" charset="0"/>
+                <a:cs typeface="Courier New" panose="02070309020205020404" pitchFamily="49" charset="0"/>
+              </a:rPr>
+              <a:t>     </a:t>
+            </a:r>
+            <a:r>
+              <a:rPr lang="en-US" sz="1600" b="1" dirty="0" err="1" smtClean="0">
+                <a:latin typeface="Courier New" panose="02070309020205020404" pitchFamily="49" charset="0"/>
+                <a:cs typeface="Courier New" panose="02070309020205020404" pitchFamily="49" charset="0"/>
+              </a:rPr>
+              <a:t>var</a:t>
+            </a:r>
+            <a:endParaRPr lang="en-US" sz="1600" b="1" dirty="0">
+              <a:latin typeface="Courier New" panose="02070309020205020404" pitchFamily="49" charset="0"/>
+              <a:cs typeface="Courier New" panose="02070309020205020404" pitchFamily="49" charset="0"/>
+            </a:endParaRPr>
+          </a:p>
+          <a:p>
+            <a:pPr marL="0" indent="0">
+              <a:buNone/>
+            </a:pPr>
+            <a:r>
+              <a:rPr lang="en-US" sz="1600" dirty="0" smtClean="0">
+                <a:latin typeface="Courier New" panose="02070309020205020404" pitchFamily="49" charset="0"/>
+                <a:cs typeface="Courier New" panose="02070309020205020404" pitchFamily="49" charset="0"/>
+              </a:rPr>
+              <a:t>	a1_below</a:t>
+            </a:r>
+            <a:r>
+              <a:rPr lang="en-US" sz="1600" dirty="0">
+                <a:latin typeface="Courier New" panose="02070309020205020404" pitchFamily="49" charset="0"/>
+                <a:cs typeface="Courier New" panose="02070309020205020404" pitchFamily="49" charset="0"/>
+              </a:rPr>
+              <a:t>, a2_below, a1_above, a2_above,</a:t>
+            </a:r>
+          </a:p>
+          <a:p>
+            <a:pPr marL="0" indent="0">
+              <a:buNone/>
+            </a:pPr>
+            <a:r>
+              <a:rPr lang="en-US" sz="1600" dirty="0" smtClean="0">
+                <a:latin typeface="Courier New" panose="02070309020205020404" pitchFamily="49" charset="0"/>
+                <a:cs typeface="Courier New" panose="02070309020205020404" pitchFamily="49" charset="0"/>
+              </a:rPr>
+              <a:t>	below</a:t>
+            </a:r>
+            <a:r>
+              <a:rPr lang="en-US" sz="1600" dirty="0">
+                <a:latin typeface="Courier New" panose="02070309020205020404" pitchFamily="49" charset="0"/>
+                <a:cs typeface="Courier New" panose="02070309020205020404" pitchFamily="49" charset="0"/>
+              </a:rPr>
+              <a:t>, </a:t>
+            </a:r>
+            <a:r>
+              <a:rPr lang="en-US" sz="1600" dirty="0" err="1">
+                <a:latin typeface="Courier New" panose="02070309020205020404" pitchFamily="49" charset="0"/>
+                <a:cs typeface="Courier New" panose="02070309020205020404" pitchFamily="49" charset="0"/>
+              </a:rPr>
+              <a:t>above_hyst</a:t>
+            </a:r>
+            <a:r>
+              <a:rPr lang="en-US" sz="1600" dirty="0">
+                <a:latin typeface="Courier New" panose="02070309020205020404" pitchFamily="49" charset="0"/>
+                <a:cs typeface="Courier New" panose="02070309020205020404" pitchFamily="49" charset="0"/>
+              </a:rPr>
+              <a:t>, d1, d2: </a:t>
+            </a:r>
+            <a:r>
+              <a:rPr lang="en-US" sz="1600" b="1" dirty="0">
+                <a:latin typeface="Courier New" panose="02070309020205020404" pitchFamily="49" charset="0"/>
+                <a:cs typeface="Courier New" panose="02070309020205020404" pitchFamily="49" charset="0"/>
+              </a:rPr>
+              <a:t>bool</a:t>
+            </a:r>
+            <a:r>
+              <a:rPr lang="en-US" sz="1600" dirty="0">
+                <a:latin typeface="Courier New" panose="02070309020205020404" pitchFamily="49" charset="0"/>
+                <a:cs typeface="Courier New" panose="02070309020205020404" pitchFamily="49" charset="0"/>
+              </a:rPr>
+              <a:t>;</a:t>
+            </a:r>
+          </a:p>
+          <a:p>
+            <a:pPr marL="0" indent="0">
+              <a:buNone/>
+            </a:pPr>
+            <a:r>
+              <a:rPr lang="en-US" sz="1600" dirty="0">
+                <a:latin typeface="Courier New" panose="02070309020205020404" pitchFamily="49" charset="0"/>
+                <a:cs typeface="Courier New" panose="02070309020205020404" pitchFamily="49" charset="0"/>
+              </a:rPr>
+              <a:t> </a:t>
+            </a:r>
+            <a:r>
+              <a:rPr lang="en-US" sz="1600" dirty="0" smtClean="0">
+                <a:latin typeface="Courier New" panose="02070309020205020404" pitchFamily="49" charset="0"/>
+                <a:cs typeface="Courier New" panose="02070309020205020404" pitchFamily="49" charset="0"/>
+              </a:rPr>
+              <a:t>    </a:t>
+            </a:r>
+            <a:r>
+              <a:rPr lang="en-US" sz="1600" b="1" dirty="0" smtClean="0">
+                <a:latin typeface="Courier New" panose="02070309020205020404" pitchFamily="49" charset="0"/>
+                <a:cs typeface="Courier New" panose="02070309020205020404" pitchFamily="49" charset="0"/>
+              </a:rPr>
+              <a:t>let</a:t>
+            </a:r>
+            <a:endParaRPr lang="en-US" sz="1600" b="1" dirty="0">
+              <a:latin typeface="Courier New" panose="02070309020205020404" pitchFamily="49" charset="0"/>
+              <a:cs typeface="Courier New" panose="02070309020205020404" pitchFamily="49" charset="0"/>
+            </a:endParaRPr>
+          </a:p>
+          <a:p>
+            <a:pPr marL="0" indent="0">
+              <a:buNone/>
+            </a:pPr>
+            <a:r>
+              <a:rPr lang="en-US" sz="1600" dirty="0" smtClean="0">
+                <a:latin typeface="Courier New" panose="02070309020205020404" pitchFamily="49" charset="0"/>
+                <a:cs typeface="Courier New" panose="02070309020205020404" pitchFamily="49" charset="0"/>
+              </a:rPr>
+              <a:t>	a1_below </a:t>
+            </a:r>
+            <a:r>
+              <a:rPr lang="en-US" sz="1600" dirty="0">
+                <a:latin typeface="Courier New" panose="02070309020205020404" pitchFamily="49" charset="0"/>
+                <a:cs typeface="Courier New" panose="02070309020205020404" pitchFamily="49" charset="0"/>
+              </a:rPr>
+              <a:t>= (alt1 </a:t>
+            </a:r>
+            <a:r>
+              <a:rPr lang="en-US" sz="1600" b="1" dirty="0">
+                <a:latin typeface="Courier New" panose="02070309020205020404" pitchFamily="49" charset="0"/>
+                <a:cs typeface="Courier New" panose="02070309020205020404" pitchFamily="49" charset="0"/>
+              </a:rPr>
+              <a:t>&lt;</a:t>
+            </a:r>
+            <a:r>
+              <a:rPr lang="en-US" sz="1600" dirty="0">
+                <a:latin typeface="Courier New" panose="02070309020205020404" pitchFamily="49" charset="0"/>
+                <a:cs typeface="Courier New" panose="02070309020205020404" pitchFamily="49" charset="0"/>
+              </a:rPr>
+              <a:t> THRESHOLD); </a:t>
+            </a:r>
+            <a:r>
+              <a:rPr lang="en-US" sz="1600" dirty="0" smtClean="0">
+                <a:latin typeface="Courier New" panose="02070309020205020404" pitchFamily="49" charset="0"/>
+                <a:cs typeface="Courier New" panose="02070309020205020404" pitchFamily="49" charset="0"/>
+              </a:rPr>
+              <a:t>        // </a:t>
+            </a:r>
+            <a:r>
+              <a:rPr lang="en-US" sz="1600" dirty="0">
+                <a:latin typeface="Courier New" panose="02070309020205020404" pitchFamily="49" charset="0"/>
+                <a:cs typeface="Courier New" panose="02070309020205020404" pitchFamily="49" charset="0"/>
+              </a:rPr>
+              <a:t>(1)</a:t>
+            </a:r>
+          </a:p>
+          <a:p>
+            <a:pPr marL="0" indent="0">
+              <a:buNone/>
+            </a:pPr>
+            <a:r>
+              <a:rPr lang="en-US" sz="1600" dirty="0" smtClean="0">
+                <a:latin typeface="Courier New" panose="02070309020205020404" pitchFamily="49" charset="0"/>
+                <a:cs typeface="Courier New" panose="02070309020205020404" pitchFamily="49" charset="0"/>
+              </a:rPr>
+              <a:t>	a2_below </a:t>
+            </a:r>
+            <a:r>
+              <a:rPr lang="en-US" sz="1600" dirty="0">
+                <a:latin typeface="Courier New" panose="02070309020205020404" pitchFamily="49" charset="0"/>
+                <a:cs typeface="Courier New" panose="02070309020205020404" pitchFamily="49" charset="0"/>
+              </a:rPr>
+              <a:t>= (alt2 </a:t>
+            </a:r>
+            <a:r>
+              <a:rPr lang="en-US" sz="1600" b="1" dirty="0">
+                <a:latin typeface="Courier New" panose="02070309020205020404" pitchFamily="49" charset="0"/>
+                <a:cs typeface="Courier New" panose="02070309020205020404" pitchFamily="49" charset="0"/>
+              </a:rPr>
+              <a:t>&lt;</a:t>
+            </a:r>
+            <a:r>
+              <a:rPr lang="en-US" sz="1600" dirty="0">
+                <a:latin typeface="Courier New" panose="02070309020205020404" pitchFamily="49" charset="0"/>
+                <a:cs typeface="Courier New" panose="02070309020205020404" pitchFamily="49" charset="0"/>
+              </a:rPr>
+              <a:t> THRESHOLD); </a:t>
+            </a:r>
+            <a:r>
+              <a:rPr lang="en-US" sz="1600" dirty="0" smtClean="0">
+                <a:latin typeface="Courier New" panose="02070309020205020404" pitchFamily="49" charset="0"/>
+                <a:cs typeface="Courier New" panose="02070309020205020404" pitchFamily="49" charset="0"/>
+              </a:rPr>
+              <a:t>        // </a:t>
+            </a:r>
+            <a:r>
+              <a:rPr lang="en-US" sz="1600" dirty="0">
+                <a:latin typeface="Courier New" panose="02070309020205020404" pitchFamily="49" charset="0"/>
+                <a:cs typeface="Courier New" panose="02070309020205020404" pitchFamily="49" charset="0"/>
+              </a:rPr>
+              <a:t>(2)</a:t>
+            </a:r>
+          </a:p>
+          <a:p>
+            <a:pPr marL="0" indent="0">
+              <a:buNone/>
+            </a:pPr>
+            <a:r>
+              <a:rPr lang="en-US" sz="1600" dirty="0" smtClean="0">
+                <a:latin typeface="Courier New" panose="02070309020205020404" pitchFamily="49" charset="0"/>
+                <a:cs typeface="Courier New" panose="02070309020205020404" pitchFamily="49" charset="0"/>
+              </a:rPr>
+              <a:t>	a1_above </a:t>
+            </a:r>
+            <a:r>
+              <a:rPr lang="en-US" sz="1600" dirty="0">
+                <a:latin typeface="Courier New" panose="02070309020205020404" pitchFamily="49" charset="0"/>
+                <a:cs typeface="Courier New" panose="02070309020205020404" pitchFamily="49" charset="0"/>
+              </a:rPr>
+              <a:t>= (alt1 </a:t>
+            </a:r>
+            <a:r>
+              <a:rPr lang="en-US" sz="1600" b="1" dirty="0">
+                <a:latin typeface="Courier New" panose="02070309020205020404" pitchFamily="49" charset="0"/>
+                <a:cs typeface="Courier New" panose="02070309020205020404" pitchFamily="49" charset="0"/>
+              </a:rPr>
+              <a:t>&gt;=</a:t>
+            </a:r>
+            <a:r>
+              <a:rPr lang="en-US" sz="1600" dirty="0">
+                <a:latin typeface="Courier New" panose="02070309020205020404" pitchFamily="49" charset="0"/>
+                <a:cs typeface="Courier New" panose="02070309020205020404" pitchFamily="49" charset="0"/>
+              </a:rPr>
+              <a:t> T_HYST); </a:t>
+            </a:r>
+            <a:r>
+              <a:rPr lang="en-US" sz="1600" dirty="0" smtClean="0">
+                <a:latin typeface="Courier New" panose="02070309020205020404" pitchFamily="49" charset="0"/>
+                <a:cs typeface="Courier New" panose="02070309020205020404" pitchFamily="49" charset="0"/>
+              </a:rPr>
+              <a:t>          // </a:t>
+            </a:r>
+            <a:r>
+              <a:rPr lang="en-US" sz="1600" dirty="0">
+                <a:latin typeface="Courier New" panose="02070309020205020404" pitchFamily="49" charset="0"/>
+                <a:cs typeface="Courier New" panose="02070309020205020404" pitchFamily="49" charset="0"/>
+              </a:rPr>
+              <a:t>(3)</a:t>
+            </a:r>
+          </a:p>
+          <a:p>
+            <a:pPr marL="0" indent="0">
+              <a:buNone/>
+            </a:pPr>
+            <a:r>
+              <a:rPr lang="en-US" sz="1600" dirty="0" smtClean="0">
+                <a:latin typeface="Courier New" panose="02070309020205020404" pitchFamily="49" charset="0"/>
+                <a:cs typeface="Courier New" panose="02070309020205020404" pitchFamily="49" charset="0"/>
+              </a:rPr>
+              <a:t>	a2_above </a:t>
+            </a:r>
+            <a:r>
+              <a:rPr lang="en-US" sz="1600" dirty="0">
+                <a:latin typeface="Courier New" panose="02070309020205020404" pitchFamily="49" charset="0"/>
+                <a:cs typeface="Courier New" panose="02070309020205020404" pitchFamily="49" charset="0"/>
+              </a:rPr>
+              <a:t>= (alt2 </a:t>
+            </a:r>
+            <a:r>
+              <a:rPr lang="en-US" sz="1600" b="1" dirty="0">
+                <a:latin typeface="Courier New" panose="02070309020205020404" pitchFamily="49" charset="0"/>
+                <a:cs typeface="Courier New" panose="02070309020205020404" pitchFamily="49" charset="0"/>
+              </a:rPr>
+              <a:t>&gt;=</a:t>
+            </a:r>
+            <a:r>
+              <a:rPr lang="en-US" sz="1600" dirty="0">
+                <a:latin typeface="Courier New" panose="02070309020205020404" pitchFamily="49" charset="0"/>
+                <a:cs typeface="Courier New" panose="02070309020205020404" pitchFamily="49" charset="0"/>
+              </a:rPr>
+              <a:t> T_HYST); </a:t>
+            </a:r>
+            <a:r>
+              <a:rPr lang="en-US" sz="1600" dirty="0" smtClean="0">
+                <a:latin typeface="Courier New" panose="02070309020205020404" pitchFamily="49" charset="0"/>
+                <a:cs typeface="Courier New" panose="02070309020205020404" pitchFamily="49" charset="0"/>
+              </a:rPr>
+              <a:t>          // </a:t>
+            </a:r>
+            <a:r>
+              <a:rPr lang="en-US" sz="1600" dirty="0">
+                <a:latin typeface="Courier New" panose="02070309020205020404" pitchFamily="49" charset="0"/>
+                <a:cs typeface="Courier New" panose="02070309020205020404" pitchFamily="49" charset="0"/>
+              </a:rPr>
+              <a:t>(4)</a:t>
+            </a:r>
+          </a:p>
+          <a:p>
+            <a:pPr marL="0" indent="0">
+              <a:buNone/>
+            </a:pPr>
+            <a:r>
+              <a:rPr lang="en-US" sz="1600" dirty="0" smtClean="0">
+                <a:latin typeface="Courier New" panose="02070309020205020404" pitchFamily="49" charset="0"/>
+                <a:cs typeface="Courier New" panose="02070309020205020404" pitchFamily="49" charset="0"/>
+              </a:rPr>
+              <a:t>	below </a:t>
+            </a:r>
+            <a:r>
+              <a:rPr lang="en-US" sz="1600" dirty="0">
+                <a:latin typeface="Courier New" panose="02070309020205020404" pitchFamily="49" charset="0"/>
+                <a:cs typeface="Courier New" panose="02070309020205020404" pitchFamily="49" charset="0"/>
+              </a:rPr>
+              <a:t>= a1_below</a:t>
+            </a:r>
+            <a:r>
+              <a:rPr lang="en-US" sz="1600" b="1" dirty="0">
+                <a:latin typeface="Courier New" panose="02070309020205020404" pitchFamily="49" charset="0"/>
+                <a:cs typeface="Courier New" panose="02070309020205020404" pitchFamily="49" charset="0"/>
+              </a:rPr>
+              <a:t> or </a:t>
+            </a:r>
+            <a:r>
+              <a:rPr lang="en-US" sz="1600" dirty="0">
+                <a:latin typeface="Courier New" panose="02070309020205020404" pitchFamily="49" charset="0"/>
+                <a:cs typeface="Courier New" panose="02070309020205020404" pitchFamily="49" charset="0"/>
+              </a:rPr>
+              <a:t>a2_below; </a:t>
+            </a:r>
+            <a:r>
+              <a:rPr lang="en-US" sz="1600" dirty="0" smtClean="0">
+                <a:latin typeface="Courier New" panose="02070309020205020404" pitchFamily="49" charset="0"/>
+                <a:cs typeface="Courier New" panose="02070309020205020404" pitchFamily="49" charset="0"/>
+              </a:rPr>
+              <a:t>         // </a:t>
+            </a:r>
+            <a:r>
+              <a:rPr lang="en-US" sz="1600" dirty="0">
+                <a:latin typeface="Courier New" panose="02070309020205020404" pitchFamily="49" charset="0"/>
+                <a:cs typeface="Courier New" panose="02070309020205020404" pitchFamily="49" charset="0"/>
+              </a:rPr>
+              <a:t>(5)</a:t>
+            </a:r>
+          </a:p>
+          <a:p>
+            <a:pPr marL="0" indent="0">
+              <a:buNone/>
+            </a:pPr>
+            <a:r>
+              <a:rPr lang="en-US" sz="1600" dirty="0" smtClean="0">
+                <a:latin typeface="Courier New" panose="02070309020205020404" pitchFamily="49" charset="0"/>
+                <a:cs typeface="Courier New" panose="02070309020205020404" pitchFamily="49" charset="0"/>
+              </a:rPr>
+              <a:t>	</a:t>
+            </a:r>
+            <a:r>
+              <a:rPr lang="en-US" sz="1600" dirty="0" err="1" smtClean="0">
+                <a:latin typeface="Courier New" panose="02070309020205020404" pitchFamily="49" charset="0"/>
+                <a:cs typeface="Courier New" panose="02070309020205020404" pitchFamily="49" charset="0"/>
+              </a:rPr>
+              <a:t>above_hyst</a:t>
+            </a:r>
+            <a:r>
+              <a:rPr lang="en-US" sz="1600" dirty="0" smtClean="0">
+                <a:latin typeface="Courier New" panose="02070309020205020404" pitchFamily="49" charset="0"/>
+                <a:cs typeface="Courier New" panose="02070309020205020404" pitchFamily="49" charset="0"/>
+              </a:rPr>
+              <a:t> </a:t>
+            </a:r>
+            <a:r>
+              <a:rPr lang="en-US" sz="1600" dirty="0">
+                <a:latin typeface="Courier New" panose="02070309020205020404" pitchFamily="49" charset="0"/>
+                <a:cs typeface="Courier New" panose="02070309020205020404" pitchFamily="49" charset="0"/>
+              </a:rPr>
+              <a:t>= a1_above </a:t>
+            </a:r>
+            <a:r>
+              <a:rPr lang="en-US" sz="1600" b="1" dirty="0">
+                <a:latin typeface="Courier New" panose="02070309020205020404" pitchFamily="49" charset="0"/>
+                <a:cs typeface="Courier New" panose="02070309020205020404" pitchFamily="49" charset="0"/>
+              </a:rPr>
+              <a:t>and</a:t>
+            </a:r>
+            <a:r>
+              <a:rPr lang="en-US" sz="1600" dirty="0">
+                <a:latin typeface="Courier New" panose="02070309020205020404" pitchFamily="49" charset="0"/>
+                <a:cs typeface="Courier New" panose="02070309020205020404" pitchFamily="49" charset="0"/>
+              </a:rPr>
+              <a:t> a2_above; </a:t>
+            </a:r>
+            <a:r>
+              <a:rPr lang="en-US" sz="1600" dirty="0" smtClean="0">
+                <a:latin typeface="Courier New" panose="02070309020205020404" pitchFamily="49" charset="0"/>
+                <a:cs typeface="Courier New" panose="02070309020205020404" pitchFamily="49" charset="0"/>
+              </a:rPr>
+              <a:t>   // </a:t>
+            </a:r>
+            <a:r>
+              <a:rPr lang="en-US" sz="1600" dirty="0">
+                <a:latin typeface="Courier New" panose="02070309020205020404" pitchFamily="49" charset="0"/>
+                <a:cs typeface="Courier New" panose="02070309020205020404" pitchFamily="49" charset="0"/>
+              </a:rPr>
+              <a:t>(6)</a:t>
+            </a:r>
+          </a:p>
+          <a:p>
+            <a:pPr marL="0" indent="0">
+              <a:buNone/>
+            </a:pPr>
+            <a:r>
+              <a:rPr lang="en-US" sz="1600" dirty="0" smtClean="0">
+                <a:latin typeface="Courier New" panose="02070309020205020404" pitchFamily="49" charset="0"/>
+                <a:cs typeface="Courier New" panose="02070309020205020404" pitchFamily="49" charset="0"/>
+              </a:rPr>
+              <a:t>	</a:t>
+            </a:r>
+            <a:r>
+              <a:rPr lang="en-US" sz="1600" dirty="0" err="1" smtClean="0">
+                <a:latin typeface="Courier New" panose="02070309020205020404" pitchFamily="49" charset="0"/>
+                <a:cs typeface="Courier New" panose="02070309020205020404" pitchFamily="49" charset="0"/>
+              </a:rPr>
+              <a:t>doi_on</a:t>
+            </a:r>
+            <a:r>
+              <a:rPr lang="en-US" sz="1600" dirty="0" smtClean="0">
+                <a:latin typeface="Courier New" panose="02070309020205020404" pitchFamily="49" charset="0"/>
+                <a:cs typeface="Courier New" panose="02070309020205020404" pitchFamily="49" charset="0"/>
+              </a:rPr>
+              <a:t> </a:t>
+            </a:r>
+            <a:r>
+              <a:rPr lang="en-US" sz="1600" dirty="0">
+                <a:latin typeface="Courier New" panose="02070309020205020404" pitchFamily="49" charset="0"/>
+                <a:cs typeface="Courier New" panose="02070309020205020404" pitchFamily="49" charset="0"/>
+              </a:rPr>
+              <a:t>= </a:t>
+            </a:r>
+            <a:r>
+              <a:rPr lang="en-US" sz="1600" b="1" dirty="0">
+                <a:latin typeface="Courier New" panose="02070309020205020404" pitchFamily="49" charset="0"/>
+                <a:cs typeface="Courier New" panose="02070309020205020404" pitchFamily="49" charset="0"/>
+              </a:rPr>
+              <a:t>if</a:t>
+            </a:r>
+            <a:r>
+              <a:rPr lang="en-US" sz="1600" dirty="0">
+                <a:latin typeface="Courier New" panose="02070309020205020404" pitchFamily="49" charset="0"/>
+                <a:cs typeface="Courier New" panose="02070309020205020404" pitchFamily="49" charset="0"/>
+              </a:rPr>
+              <a:t> (below </a:t>
+            </a:r>
+            <a:r>
+              <a:rPr lang="en-US" sz="1600" b="1" dirty="0">
+                <a:latin typeface="Courier New" panose="02070309020205020404" pitchFamily="49" charset="0"/>
+                <a:cs typeface="Courier New" panose="02070309020205020404" pitchFamily="49" charset="0"/>
+              </a:rPr>
+              <a:t>and</a:t>
+            </a:r>
+            <a:r>
+              <a:rPr lang="en-US" sz="1600" dirty="0">
+                <a:latin typeface="Courier New" panose="02070309020205020404" pitchFamily="49" charset="0"/>
+                <a:cs typeface="Courier New" panose="02070309020205020404" pitchFamily="49" charset="0"/>
+              </a:rPr>
+              <a:t> </a:t>
+            </a:r>
+            <a:r>
+              <a:rPr lang="en-US" sz="1600" b="1" dirty="0">
+                <a:latin typeface="Courier New" panose="02070309020205020404" pitchFamily="49" charset="0"/>
+                <a:cs typeface="Courier New" panose="02070309020205020404" pitchFamily="49" charset="0"/>
+              </a:rPr>
+              <a:t>not</a:t>
+            </a:r>
+            <a:r>
+              <a:rPr lang="en-US" sz="1600" dirty="0">
+                <a:latin typeface="Courier New" panose="02070309020205020404" pitchFamily="49" charset="0"/>
+                <a:cs typeface="Courier New" panose="02070309020205020404" pitchFamily="49" charset="0"/>
+              </a:rPr>
+              <a:t> inhibit) </a:t>
+            </a:r>
+            <a:r>
+              <a:rPr lang="en-US" sz="1600" dirty="0" smtClean="0">
+                <a:latin typeface="Courier New" panose="02070309020205020404" pitchFamily="49" charset="0"/>
+                <a:cs typeface="Courier New" panose="02070309020205020404" pitchFamily="49" charset="0"/>
+              </a:rPr>
+              <a:t>   // </a:t>
+            </a:r>
+            <a:r>
+              <a:rPr lang="en-US" sz="1600" dirty="0">
+                <a:latin typeface="Courier New" panose="02070309020205020404" pitchFamily="49" charset="0"/>
+                <a:cs typeface="Courier New" panose="02070309020205020404" pitchFamily="49" charset="0"/>
+              </a:rPr>
+              <a:t>(7)</a:t>
+            </a:r>
+          </a:p>
+          <a:p>
+            <a:pPr marL="0" indent="0">
+              <a:buNone/>
+            </a:pPr>
+            <a:r>
+              <a:rPr lang="en-US" sz="1600" dirty="0" smtClean="0">
+                <a:latin typeface="Courier New" panose="02070309020205020404" pitchFamily="49" charset="0"/>
+                <a:cs typeface="Courier New" panose="02070309020205020404" pitchFamily="49" charset="0"/>
+              </a:rPr>
+              <a:t>		 </a:t>
+            </a:r>
+            <a:r>
+              <a:rPr lang="en-US" sz="1600" dirty="0" smtClean="0">
+                <a:latin typeface="Courier New" panose="02070309020205020404" pitchFamily="49" charset="0"/>
+                <a:cs typeface="Courier New" panose="02070309020205020404" pitchFamily="49" charset="0"/>
+              </a:rPr>
+              <a:t> </a:t>
+            </a:r>
+            <a:r>
+              <a:rPr lang="en-US" sz="1600" b="1" dirty="0" smtClean="0">
+                <a:latin typeface="Courier New" panose="02070309020205020404" pitchFamily="49" charset="0"/>
+                <a:cs typeface="Courier New" panose="02070309020205020404" pitchFamily="49" charset="0"/>
+              </a:rPr>
+              <a:t>t</a:t>
+            </a:r>
+            <a:r>
+              <a:rPr lang="en-US" sz="1600" b="1" dirty="0" smtClean="0">
+                <a:latin typeface="Courier New" panose="02070309020205020404" pitchFamily="49" charset="0"/>
+                <a:cs typeface="Courier New" panose="02070309020205020404" pitchFamily="49" charset="0"/>
+              </a:rPr>
+              <a:t>hen</a:t>
+            </a:r>
+            <a:r>
+              <a:rPr lang="en-US" sz="1600" dirty="0" smtClean="0">
+                <a:latin typeface="Courier New" panose="02070309020205020404" pitchFamily="49" charset="0"/>
+                <a:cs typeface="Courier New" panose="02070309020205020404" pitchFamily="49" charset="0"/>
+              </a:rPr>
+              <a:t> </a:t>
+            </a:r>
+            <a:r>
+              <a:rPr lang="en-US" sz="1600" i="1" dirty="0">
+                <a:latin typeface="Courier New" panose="02070309020205020404" pitchFamily="49" charset="0"/>
+                <a:cs typeface="Courier New" panose="02070309020205020404" pitchFamily="49" charset="0"/>
+              </a:rPr>
+              <a:t>true</a:t>
+            </a:r>
+            <a:r>
+              <a:rPr lang="en-US" sz="1600" dirty="0">
+                <a:latin typeface="Courier New" panose="02070309020205020404" pitchFamily="49" charset="0"/>
+                <a:cs typeface="Courier New" panose="02070309020205020404" pitchFamily="49" charset="0"/>
+              </a:rPr>
+              <a:t> </a:t>
+            </a:r>
+            <a:r>
+              <a:rPr lang="en-US" sz="1600" b="1" dirty="0">
+                <a:latin typeface="Courier New" panose="02070309020205020404" pitchFamily="49" charset="0"/>
+                <a:cs typeface="Courier New" panose="02070309020205020404" pitchFamily="49" charset="0"/>
+              </a:rPr>
+              <a:t>else</a:t>
+            </a:r>
+            <a:r>
+              <a:rPr lang="en-US" sz="1600" dirty="0">
+                <a:latin typeface="Courier New" panose="02070309020205020404" pitchFamily="49" charset="0"/>
+                <a:cs typeface="Courier New" panose="02070309020205020404" pitchFamily="49" charset="0"/>
+              </a:rPr>
+              <a:t> d1;</a:t>
+            </a:r>
+          </a:p>
+          <a:p>
+            <a:pPr marL="0" indent="0">
+              <a:buNone/>
+            </a:pPr>
+            <a:r>
+              <a:rPr lang="en-US" sz="1600" dirty="0" smtClean="0">
+                <a:latin typeface="Courier New" panose="02070309020205020404" pitchFamily="49" charset="0"/>
+                <a:cs typeface="Courier New" panose="02070309020205020404" pitchFamily="49" charset="0"/>
+              </a:rPr>
+              <a:t>	d1 </a:t>
+            </a:r>
+            <a:r>
+              <a:rPr lang="en-US" sz="1600" dirty="0">
+                <a:latin typeface="Courier New" panose="02070309020205020404" pitchFamily="49" charset="0"/>
+                <a:cs typeface="Courier New" panose="02070309020205020404" pitchFamily="49" charset="0"/>
+              </a:rPr>
+              <a:t>= </a:t>
+            </a:r>
+            <a:r>
+              <a:rPr lang="en-US" sz="1600" b="1" dirty="0">
+                <a:latin typeface="Courier New" panose="02070309020205020404" pitchFamily="49" charset="0"/>
+                <a:cs typeface="Courier New" panose="02070309020205020404" pitchFamily="49" charset="0"/>
+              </a:rPr>
+              <a:t>if</a:t>
+            </a:r>
+            <a:r>
+              <a:rPr lang="en-US" sz="1600" dirty="0">
+                <a:latin typeface="Courier New" panose="02070309020205020404" pitchFamily="49" charset="0"/>
+                <a:cs typeface="Courier New" panose="02070309020205020404" pitchFamily="49" charset="0"/>
+              </a:rPr>
+              <a:t> (inhibit </a:t>
+            </a:r>
+            <a:r>
+              <a:rPr lang="en-US" sz="1600" b="1" dirty="0">
+                <a:latin typeface="Courier New" panose="02070309020205020404" pitchFamily="49" charset="0"/>
+                <a:cs typeface="Courier New" panose="02070309020205020404" pitchFamily="49" charset="0"/>
+              </a:rPr>
+              <a:t>or</a:t>
+            </a:r>
+            <a:r>
+              <a:rPr lang="en-US" sz="1600" dirty="0">
+                <a:latin typeface="Courier New" panose="02070309020205020404" pitchFamily="49" charset="0"/>
+                <a:cs typeface="Courier New" panose="02070309020205020404" pitchFamily="49" charset="0"/>
+              </a:rPr>
+              <a:t> </a:t>
+            </a:r>
+            <a:r>
+              <a:rPr lang="en-US" sz="1600" dirty="0" err="1">
+                <a:latin typeface="Courier New" panose="02070309020205020404" pitchFamily="49" charset="0"/>
+                <a:cs typeface="Courier New" panose="02070309020205020404" pitchFamily="49" charset="0"/>
+              </a:rPr>
+              <a:t>above_hyst</a:t>
+            </a:r>
+            <a:r>
+              <a:rPr lang="en-US" sz="1600" dirty="0">
+                <a:latin typeface="Courier New" panose="02070309020205020404" pitchFamily="49" charset="0"/>
+                <a:cs typeface="Courier New" panose="02070309020205020404" pitchFamily="49" charset="0"/>
+              </a:rPr>
+              <a:t>) </a:t>
+            </a:r>
+            <a:r>
+              <a:rPr lang="en-US" sz="1600" dirty="0" smtClean="0">
+                <a:latin typeface="Courier New" panose="02070309020205020404" pitchFamily="49" charset="0"/>
+                <a:cs typeface="Courier New" panose="02070309020205020404" pitchFamily="49" charset="0"/>
+              </a:rPr>
+              <a:t>       // </a:t>
+            </a:r>
+            <a:r>
+              <a:rPr lang="en-US" sz="1600" dirty="0">
+                <a:latin typeface="Courier New" panose="02070309020205020404" pitchFamily="49" charset="0"/>
+                <a:cs typeface="Courier New" panose="02070309020205020404" pitchFamily="49" charset="0"/>
+              </a:rPr>
+              <a:t>(8)</a:t>
+            </a:r>
+          </a:p>
+          <a:p>
+            <a:pPr marL="0" indent="0">
+              <a:buNone/>
+            </a:pPr>
+            <a:r>
+              <a:rPr lang="en-US" sz="1600" dirty="0" smtClean="0">
+                <a:latin typeface="Courier New" panose="02070309020205020404" pitchFamily="49" charset="0"/>
+                <a:cs typeface="Courier New" panose="02070309020205020404" pitchFamily="49" charset="0"/>
+              </a:rPr>
+              <a:t>	     </a:t>
+            </a:r>
+            <a:r>
+              <a:rPr lang="en-US" sz="1600" b="1" dirty="0" smtClean="0">
+                <a:latin typeface="Courier New" panose="02070309020205020404" pitchFamily="49" charset="0"/>
+                <a:cs typeface="Courier New" panose="02070309020205020404" pitchFamily="49" charset="0"/>
+              </a:rPr>
+              <a:t>then</a:t>
+            </a:r>
+            <a:r>
+              <a:rPr lang="en-US" sz="1600" dirty="0" smtClean="0">
+                <a:latin typeface="Courier New" panose="02070309020205020404" pitchFamily="49" charset="0"/>
+                <a:cs typeface="Courier New" panose="02070309020205020404" pitchFamily="49" charset="0"/>
+              </a:rPr>
+              <a:t> </a:t>
+            </a:r>
+            <a:r>
+              <a:rPr lang="en-US" sz="1600" i="1" dirty="0">
+                <a:latin typeface="Courier New" panose="02070309020205020404" pitchFamily="49" charset="0"/>
+                <a:cs typeface="Courier New" panose="02070309020205020404" pitchFamily="49" charset="0"/>
+              </a:rPr>
+              <a:t>false</a:t>
+            </a:r>
+            <a:r>
+              <a:rPr lang="en-US" sz="1600" dirty="0">
+                <a:latin typeface="Courier New" panose="02070309020205020404" pitchFamily="49" charset="0"/>
+                <a:cs typeface="Courier New" panose="02070309020205020404" pitchFamily="49" charset="0"/>
+              </a:rPr>
+              <a:t> </a:t>
+            </a:r>
+            <a:r>
+              <a:rPr lang="en-US" sz="1600" b="1" dirty="0">
+                <a:latin typeface="Courier New" panose="02070309020205020404" pitchFamily="49" charset="0"/>
+                <a:cs typeface="Courier New" panose="02070309020205020404" pitchFamily="49" charset="0"/>
+              </a:rPr>
+              <a:t>else</a:t>
+            </a:r>
+            <a:r>
+              <a:rPr lang="en-US" sz="1600" dirty="0">
+                <a:latin typeface="Courier New" panose="02070309020205020404" pitchFamily="49" charset="0"/>
+                <a:cs typeface="Courier New" panose="02070309020205020404" pitchFamily="49" charset="0"/>
+              </a:rPr>
+              <a:t> d2;</a:t>
+            </a:r>
+          </a:p>
+          <a:p>
+            <a:pPr marL="0" indent="0">
+              <a:buNone/>
+            </a:pPr>
+            <a:r>
+              <a:rPr lang="en-US" sz="1600" dirty="0" smtClean="0">
+                <a:latin typeface="Courier New" panose="02070309020205020404" pitchFamily="49" charset="0"/>
+                <a:cs typeface="Courier New" panose="02070309020205020404" pitchFamily="49" charset="0"/>
+              </a:rPr>
+              <a:t>	d2 </a:t>
+            </a:r>
+            <a:r>
+              <a:rPr lang="en-US" sz="1600" dirty="0">
+                <a:latin typeface="Courier New" panose="02070309020205020404" pitchFamily="49" charset="0"/>
+                <a:cs typeface="Courier New" panose="02070309020205020404" pitchFamily="49" charset="0"/>
+              </a:rPr>
+              <a:t>= (</a:t>
+            </a:r>
+            <a:r>
+              <a:rPr lang="en-US" sz="1600" i="1" dirty="0">
+                <a:latin typeface="Courier New" panose="02070309020205020404" pitchFamily="49" charset="0"/>
+                <a:cs typeface="Courier New" panose="02070309020205020404" pitchFamily="49" charset="0"/>
+              </a:rPr>
+              <a:t>false</a:t>
+            </a:r>
+            <a:r>
+              <a:rPr lang="en-US" sz="1600" dirty="0">
+                <a:latin typeface="Courier New" panose="02070309020205020404" pitchFamily="49" charset="0"/>
+                <a:cs typeface="Courier New" panose="02070309020205020404" pitchFamily="49" charset="0"/>
+              </a:rPr>
+              <a:t> </a:t>
+            </a:r>
+            <a:r>
+              <a:rPr lang="en-US" sz="1600" b="1" dirty="0">
+                <a:latin typeface="Courier New" panose="02070309020205020404" pitchFamily="49" charset="0"/>
+                <a:cs typeface="Courier New" panose="02070309020205020404" pitchFamily="49" charset="0"/>
+              </a:rPr>
+              <a:t>-&gt;</a:t>
+            </a:r>
+            <a:r>
+              <a:rPr lang="en-US" sz="1600" dirty="0">
+                <a:latin typeface="Courier New" panose="02070309020205020404" pitchFamily="49" charset="0"/>
+                <a:cs typeface="Courier New" panose="02070309020205020404" pitchFamily="49" charset="0"/>
+              </a:rPr>
+              <a:t> </a:t>
+            </a:r>
+            <a:r>
+              <a:rPr lang="en-US" sz="1600" i="1" dirty="0">
+                <a:latin typeface="Courier New" panose="02070309020205020404" pitchFamily="49" charset="0"/>
+                <a:cs typeface="Courier New" panose="02070309020205020404" pitchFamily="49" charset="0"/>
+              </a:rPr>
+              <a:t>pre</a:t>
+            </a:r>
+            <a:r>
+              <a:rPr lang="en-US" sz="1600" dirty="0">
+                <a:latin typeface="Courier New" panose="02070309020205020404" pitchFamily="49" charset="0"/>
+                <a:cs typeface="Courier New" panose="02070309020205020404" pitchFamily="49" charset="0"/>
+              </a:rPr>
+              <a:t>(</a:t>
+            </a:r>
+            <a:r>
+              <a:rPr lang="en-US" sz="1600" dirty="0" err="1">
+                <a:latin typeface="Courier New" panose="02070309020205020404" pitchFamily="49" charset="0"/>
+                <a:cs typeface="Courier New" panose="02070309020205020404" pitchFamily="49" charset="0"/>
+              </a:rPr>
+              <a:t>doi_on</a:t>
+            </a:r>
+            <a:r>
+              <a:rPr lang="en-US" sz="1600" dirty="0">
+                <a:latin typeface="Courier New" panose="02070309020205020404" pitchFamily="49" charset="0"/>
+                <a:cs typeface="Courier New" panose="02070309020205020404" pitchFamily="49" charset="0"/>
+              </a:rPr>
+              <a:t>)); </a:t>
+            </a:r>
+            <a:r>
+              <a:rPr lang="en-US" sz="1600" dirty="0" smtClean="0">
+                <a:latin typeface="Courier New" panose="02070309020205020404" pitchFamily="49" charset="0"/>
+                <a:cs typeface="Courier New" panose="02070309020205020404" pitchFamily="49" charset="0"/>
+              </a:rPr>
+              <a:t>          // </a:t>
+            </a:r>
+            <a:r>
+              <a:rPr lang="en-US" sz="1600" dirty="0">
+                <a:latin typeface="Courier New" panose="02070309020205020404" pitchFamily="49" charset="0"/>
+                <a:cs typeface="Courier New" panose="02070309020205020404" pitchFamily="49" charset="0"/>
+              </a:rPr>
+              <a:t>(9)</a:t>
+            </a:r>
+          </a:p>
+          <a:p>
+            <a:pPr marL="0" indent="0">
+              <a:buNone/>
+            </a:pPr>
+            <a:r>
+              <a:rPr lang="en-US" sz="1600" dirty="0">
+                <a:latin typeface="Courier New" panose="02070309020205020404" pitchFamily="49" charset="0"/>
+                <a:cs typeface="Courier New" panose="02070309020205020404" pitchFamily="49" charset="0"/>
+              </a:rPr>
+              <a:t> </a:t>
+            </a:r>
+            <a:r>
+              <a:rPr lang="en-US" sz="1600" dirty="0" smtClean="0">
+                <a:latin typeface="Courier New" panose="02070309020205020404" pitchFamily="49" charset="0"/>
+                <a:cs typeface="Courier New" panose="02070309020205020404" pitchFamily="49" charset="0"/>
+              </a:rPr>
+              <a:t>    </a:t>
+            </a:r>
+            <a:r>
+              <a:rPr lang="en-US" sz="1600" b="1" dirty="0" err="1" smtClean="0">
+                <a:latin typeface="Courier New" panose="02070309020205020404" pitchFamily="49" charset="0"/>
+                <a:cs typeface="Courier New" panose="02070309020205020404" pitchFamily="49" charset="0"/>
+              </a:rPr>
+              <a:t>tel</a:t>
+            </a:r>
+            <a:r>
+              <a:rPr lang="en-US" sz="1600" dirty="0">
+                <a:latin typeface="Courier New" panose="02070309020205020404" pitchFamily="49" charset="0"/>
+                <a:cs typeface="Courier New" panose="02070309020205020404" pitchFamily="49" charset="0"/>
+              </a:rPr>
+              <a:t>;</a:t>
+            </a:r>
+          </a:p>
+        </p:txBody>
+      </p:sp>
+    </p:spTree>
+    <p:extLst>
+      <p:ext uri="{BB962C8B-B14F-4D97-AF65-F5344CB8AC3E}">
+        <p14:creationId xmlns:p14="http://schemas.microsoft.com/office/powerpoint/2010/main" val="2384783780"/>
+      </p:ext>
+    </p:extLst>
+  </p:cSld>
+  <p:clrMapOvr>
+    <a:masterClrMapping/>
+  </p:clrMapOvr>
+</p:sld>
+</file>
+
+<file path=ppt/slides/slide4.xml><?xml version="1.0" encoding="utf-8"?>
 <p:sld xmlns:a="http://schemas.openxmlformats.org/drawingml/2006/main" xmlns:r="http://schemas.openxmlformats.org/officeDocument/2006/relationships" xmlns:p="http://schemas.openxmlformats.org/presentationml/2006/main">
   <p:cSld>
     <p:spTree>
@@ -5803,7 +6809,7 @@
 </p:sld>
 </file>
 
-<file path=ppt/slides/slide4.xml><?xml version="1.0" encoding="utf-8"?>
+<file path=ppt/slides/slide5.xml><?xml version="1.0" encoding="utf-8"?>
 <p:sld xmlns:a="http://schemas.openxmlformats.org/drawingml/2006/main" xmlns:r="http://schemas.openxmlformats.org/officeDocument/2006/relationships" xmlns:p="http://schemas.openxmlformats.org/presentationml/2006/main">
   <p:cSld>
     <p:spTree>

</xml_diff>

<commit_message>
update the example pic
</commit_message>
<xml_diff>
--- a/completeness/completeness_TEX/figs/figs.pptx
+++ b/completeness/completeness_TEX/figs/figs.pptx
@@ -247,7 +247,7 @@
           <a:p>
             <a:fld id="{5A779009-EA30-43A9-A43B-F006CC3D9B84}" type="datetimeFigureOut">
               <a:rPr lang="en-US" smtClean="0"/>
-              <a:t>1/22/2017</a:t>
+              <a:t>2/2/2017</a:t>
             </a:fld>
             <a:endParaRPr lang="en-US"/>
           </a:p>
@@ -417,7 +417,7 @@
           <a:p>
             <a:fld id="{5A779009-EA30-43A9-A43B-F006CC3D9B84}" type="datetimeFigureOut">
               <a:rPr lang="en-US" smtClean="0"/>
-              <a:t>1/22/2017</a:t>
+              <a:t>2/2/2017</a:t>
             </a:fld>
             <a:endParaRPr lang="en-US"/>
           </a:p>
@@ -597,7 +597,7 @@
           <a:p>
             <a:fld id="{5A779009-EA30-43A9-A43B-F006CC3D9B84}" type="datetimeFigureOut">
               <a:rPr lang="en-US" smtClean="0"/>
-              <a:t>1/22/2017</a:t>
+              <a:t>2/2/2017</a:t>
             </a:fld>
             <a:endParaRPr lang="en-US"/>
           </a:p>
@@ -767,7 +767,7 @@
           <a:p>
             <a:fld id="{5A779009-EA30-43A9-A43B-F006CC3D9B84}" type="datetimeFigureOut">
               <a:rPr lang="en-US" smtClean="0"/>
-              <a:t>1/22/2017</a:t>
+              <a:t>2/2/2017</a:t>
             </a:fld>
             <a:endParaRPr lang="en-US"/>
           </a:p>
@@ -1013,7 +1013,7 @@
           <a:p>
             <a:fld id="{5A779009-EA30-43A9-A43B-F006CC3D9B84}" type="datetimeFigureOut">
               <a:rPr lang="en-US" smtClean="0"/>
-              <a:t>1/22/2017</a:t>
+              <a:t>2/2/2017</a:t>
             </a:fld>
             <a:endParaRPr lang="en-US"/>
           </a:p>
@@ -1245,7 +1245,7 @@
           <a:p>
             <a:fld id="{5A779009-EA30-43A9-A43B-F006CC3D9B84}" type="datetimeFigureOut">
               <a:rPr lang="en-US" smtClean="0"/>
-              <a:t>1/22/2017</a:t>
+              <a:t>2/2/2017</a:t>
             </a:fld>
             <a:endParaRPr lang="en-US"/>
           </a:p>
@@ -1612,7 +1612,7 @@
           <a:p>
             <a:fld id="{5A779009-EA30-43A9-A43B-F006CC3D9B84}" type="datetimeFigureOut">
               <a:rPr lang="en-US" smtClean="0"/>
-              <a:t>1/22/2017</a:t>
+              <a:t>2/2/2017</a:t>
             </a:fld>
             <a:endParaRPr lang="en-US"/>
           </a:p>
@@ -1730,7 +1730,7 @@
           <a:p>
             <a:fld id="{5A779009-EA30-43A9-A43B-F006CC3D9B84}" type="datetimeFigureOut">
               <a:rPr lang="en-US" smtClean="0"/>
-              <a:t>1/22/2017</a:t>
+              <a:t>2/2/2017</a:t>
             </a:fld>
             <a:endParaRPr lang="en-US"/>
           </a:p>
@@ -1825,7 +1825,7 @@
           <a:p>
             <a:fld id="{5A779009-EA30-43A9-A43B-F006CC3D9B84}" type="datetimeFigureOut">
               <a:rPr lang="en-US" smtClean="0"/>
-              <a:t>1/22/2017</a:t>
+              <a:t>2/2/2017</a:t>
             </a:fld>
             <a:endParaRPr lang="en-US"/>
           </a:p>
@@ -2102,7 +2102,7 @@
           <a:p>
             <a:fld id="{5A779009-EA30-43A9-A43B-F006CC3D9B84}" type="datetimeFigureOut">
               <a:rPr lang="en-US" smtClean="0"/>
-              <a:t>1/22/2017</a:t>
+              <a:t>2/2/2017</a:t>
             </a:fld>
             <a:endParaRPr lang="en-US"/>
           </a:p>
@@ -2355,7 +2355,7 @@
           <a:p>
             <a:fld id="{5A779009-EA30-43A9-A43B-F006CC3D9B84}" type="datetimeFigureOut">
               <a:rPr lang="en-US" smtClean="0"/>
-              <a:t>1/22/2017</a:t>
+              <a:t>2/2/2017</a:t>
             </a:fld>
             <a:endParaRPr lang="en-US"/>
           </a:p>
@@ -2568,7 +2568,7 @@
           <a:p>
             <a:fld id="{5A779009-EA30-43A9-A43B-F006CC3D9B84}" type="datetimeFigureOut">
               <a:rPr lang="en-US" smtClean="0"/>
-              <a:t>1/22/2017</a:t>
+              <a:t>2/2/2017</a:t>
             </a:fld>
             <a:endParaRPr lang="en-US"/>
           </a:p>
@@ -4321,8 +4321,8 @@
         </p:nvSpPr>
         <p:spPr>
           <a:xfrm>
-            <a:off x="838200" y="577970"/>
-            <a:ext cx="6640902" cy="6219645"/>
+            <a:off x="2114910" y="155276"/>
+            <a:ext cx="5636226" cy="7502824"/>
           </a:xfrm>
         </p:spPr>
         <p:txBody>
@@ -4332,170 +4332,196 @@
           <a:lstStyle/>
           <a:p>
             <a:pPr marL="0" indent="0">
+              <a:lnSpc>
+                <a:spcPct val="120000"/>
+              </a:lnSpc>
               <a:buNone/>
             </a:pPr>
             <a:r>
+              <a:rPr lang="en-US" sz="1600" b="1" dirty="0" smtClean="0">
+                <a:latin typeface="Consolas" panose="020B0609020204030204" pitchFamily="49" charset="0"/>
+                <a:cs typeface="Courier New" panose="02070309020205020404" pitchFamily="49" charset="0"/>
+              </a:rPr>
+              <a:t>  node</a:t>
+            </a:r>
+            <a:r>
+              <a:rPr lang="en-US" sz="1600" dirty="0" smtClean="0">
+                <a:latin typeface="Consolas" panose="020B0609020204030204" pitchFamily="49" charset="0"/>
+                <a:cs typeface="Courier New" panose="02070309020205020404" pitchFamily="49" charset="0"/>
+              </a:rPr>
+              <a:t> </a:t>
+            </a:r>
+            <a:r>
+              <a:rPr lang="en-US" sz="1600" dirty="0" err="1">
+                <a:latin typeface="Consolas" panose="020B0609020204030204" pitchFamily="49" charset="0"/>
+                <a:cs typeface="Courier New" panose="02070309020205020404" pitchFamily="49" charset="0"/>
+              </a:rPr>
+              <a:t>asw</a:t>
+            </a:r>
+            <a:r>
+              <a:rPr lang="en-US" sz="1600" dirty="0">
+                <a:latin typeface="Consolas" panose="020B0609020204030204" pitchFamily="49" charset="0"/>
+                <a:cs typeface="Courier New" panose="02070309020205020404" pitchFamily="49" charset="0"/>
+              </a:rPr>
+              <a:t>(alt1, alt2: </a:t>
+            </a:r>
+            <a:r>
+              <a:rPr lang="en-US" sz="1600" b="1" dirty="0" err="1">
+                <a:latin typeface="Consolas" panose="020B0609020204030204" pitchFamily="49" charset="0"/>
+                <a:cs typeface="Courier New" panose="02070309020205020404" pitchFamily="49" charset="0"/>
+              </a:rPr>
+              <a:t>int</a:t>
+            </a:r>
+            <a:r>
+              <a:rPr lang="en-US" sz="1600" dirty="0">
+                <a:latin typeface="Consolas" panose="020B0609020204030204" pitchFamily="49" charset="0"/>
+                <a:cs typeface="Courier New" panose="02070309020205020404" pitchFamily="49" charset="0"/>
+              </a:rPr>
+              <a:t>; inhibit: </a:t>
+            </a:r>
+            <a:r>
               <a:rPr lang="en-US" sz="1600" b="1" dirty="0">
-                <a:latin typeface="Courier New" panose="02070309020205020404" pitchFamily="49" charset="0"/>
-                <a:cs typeface="Courier New" panose="02070309020205020404" pitchFamily="49" charset="0"/>
-              </a:rPr>
-              <a:t>node</a:t>
+                <a:latin typeface="Consolas" panose="020B0609020204030204" pitchFamily="49" charset="0"/>
+                <a:cs typeface="Courier New" panose="02070309020205020404" pitchFamily="49" charset="0"/>
+              </a:rPr>
+              <a:t>bool</a:t>
             </a:r>
             <a:r>
               <a:rPr lang="en-US" sz="1600" dirty="0">
-                <a:latin typeface="Courier New" panose="02070309020205020404" pitchFamily="49" charset="0"/>
+                <a:latin typeface="Consolas" panose="020B0609020204030204" pitchFamily="49" charset="0"/>
+                <a:cs typeface="Courier New" panose="02070309020205020404" pitchFamily="49" charset="0"/>
+              </a:rPr>
+              <a:t>)</a:t>
+            </a:r>
+          </a:p>
+          <a:p>
+            <a:pPr marL="0" indent="0">
+              <a:lnSpc>
+                <a:spcPct val="120000"/>
+              </a:lnSpc>
+              <a:buNone/>
+            </a:pPr>
+            <a:r>
+              <a:rPr lang="en-US" sz="1600" dirty="0">
+                <a:latin typeface="Consolas" panose="020B0609020204030204" pitchFamily="49" charset="0"/>
                 <a:cs typeface="Courier New" panose="02070309020205020404" pitchFamily="49" charset="0"/>
               </a:rPr>
               <a:t> </a:t>
             </a:r>
             <a:r>
+              <a:rPr lang="en-US" sz="1600" dirty="0" smtClean="0">
+                <a:latin typeface="Consolas" panose="020B0609020204030204" pitchFamily="49" charset="0"/>
+                <a:cs typeface="Courier New" panose="02070309020205020404" pitchFamily="49" charset="0"/>
+              </a:rPr>
+              <a:t>    </a:t>
+            </a:r>
+            <a:r>
+              <a:rPr lang="en-US" sz="1600" dirty="0" smtClean="0">
+                <a:latin typeface="Consolas" panose="020B0609020204030204" pitchFamily="49" charset="0"/>
+                <a:cs typeface="Courier New" panose="02070309020205020404" pitchFamily="49" charset="0"/>
+              </a:rPr>
+              <a:t>  </a:t>
+            </a:r>
+            <a:r>
+              <a:rPr lang="en-US" sz="1600" b="1" dirty="0" smtClean="0">
+                <a:latin typeface="Consolas" panose="020B0609020204030204" pitchFamily="49" charset="0"/>
+                <a:cs typeface="Courier New" panose="02070309020205020404" pitchFamily="49" charset="0"/>
+              </a:rPr>
+              <a:t>returns</a:t>
+            </a:r>
+            <a:r>
+              <a:rPr lang="en-US" sz="1600" dirty="0" smtClean="0">
+                <a:latin typeface="Consolas" panose="020B0609020204030204" pitchFamily="49" charset="0"/>
+                <a:cs typeface="Courier New" panose="02070309020205020404" pitchFamily="49" charset="0"/>
+              </a:rPr>
+              <a:t> </a:t>
+            </a:r>
+            <a:r>
+              <a:rPr lang="en-US" sz="1600" dirty="0">
+                <a:latin typeface="Consolas" panose="020B0609020204030204" pitchFamily="49" charset="0"/>
+                <a:cs typeface="Courier New" panose="02070309020205020404" pitchFamily="49" charset="0"/>
+              </a:rPr>
+              <a:t>(</a:t>
+            </a:r>
+            <a:r>
               <a:rPr lang="en-US" sz="1600" dirty="0" err="1">
-                <a:latin typeface="Courier New" panose="02070309020205020404" pitchFamily="49" charset="0"/>
-                <a:cs typeface="Courier New" panose="02070309020205020404" pitchFamily="49" charset="0"/>
-              </a:rPr>
-              <a:t>asw</a:t>
+                <a:latin typeface="Consolas" panose="020B0609020204030204" pitchFamily="49" charset="0"/>
+                <a:cs typeface="Courier New" panose="02070309020205020404" pitchFamily="49" charset="0"/>
+              </a:rPr>
+              <a:t>doi_on</a:t>
             </a:r>
             <a:r>
               <a:rPr lang="en-US" sz="1600" dirty="0">
-                <a:latin typeface="Courier New" panose="02070309020205020404" pitchFamily="49" charset="0"/>
-                <a:cs typeface="Courier New" panose="02070309020205020404" pitchFamily="49" charset="0"/>
-              </a:rPr>
-              <a:t>(alt1, alt2: </a:t>
-            </a:r>
-            <a:r>
-              <a:rPr lang="en-US" sz="1600" b="1" dirty="0" err="1">
-                <a:latin typeface="Courier New" panose="02070309020205020404" pitchFamily="49" charset="0"/>
-                <a:cs typeface="Courier New" panose="02070309020205020404" pitchFamily="49" charset="0"/>
-              </a:rPr>
-              <a:t>int</a:t>
+                <a:latin typeface="Consolas" panose="020B0609020204030204" pitchFamily="49" charset="0"/>
+                <a:cs typeface="Courier New" panose="02070309020205020404" pitchFamily="49" charset="0"/>
+              </a:rPr>
+              <a:t>: </a:t>
+            </a:r>
+            <a:r>
+              <a:rPr lang="en-US" sz="1600" b="1" dirty="0">
+                <a:latin typeface="Consolas" panose="020B0609020204030204" pitchFamily="49" charset="0"/>
+                <a:cs typeface="Courier New" panose="02070309020205020404" pitchFamily="49" charset="0"/>
+              </a:rPr>
+              <a:t>bool</a:t>
             </a:r>
             <a:r>
               <a:rPr lang="en-US" sz="1600" dirty="0">
-                <a:latin typeface="Courier New" panose="02070309020205020404" pitchFamily="49" charset="0"/>
-                <a:cs typeface="Courier New" panose="02070309020205020404" pitchFamily="49" charset="0"/>
-              </a:rPr>
-              <a:t>; inhibit: </a:t>
-            </a:r>
-            <a:r>
-              <a:rPr lang="en-US" sz="1600" b="1" dirty="0">
-                <a:latin typeface="Courier New" panose="02070309020205020404" pitchFamily="49" charset="0"/>
-                <a:cs typeface="Courier New" panose="02070309020205020404" pitchFamily="49" charset="0"/>
-              </a:rPr>
-              <a:t>bool</a:t>
-            </a:r>
-            <a:r>
-              <a:rPr lang="en-US" sz="1600" dirty="0">
-                <a:latin typeface="Courier New" panose="02070309020205020404" pitchFamily="49" charset="0"/>
-                <a:cs typeface="Courier New" panose="02070309020205020404" pitchFamily="49" charset="0"/>
-              </a:rPr>
-              <a:t>)</a:t>
+                <a:latin typeface="Consolas" panose="020B0609020204030204" pitchFamily="49" charset="0"/>
+                <a:cs typeface="Courier New" panose="02070309020205020404" pitchFamily="49" charset="0"/>
+              </a:rPr>
+              <a:t>);</a:t>
             </a:r>
           </a:p>
           <a:p>
             <a:pPr marL="0" indent="0">
+              <a:lnSpc>
+                <a:spcPct val="120000"/>
+              </a:lnSpc>
               <a:buNone/>
             </a:pPr>
             <a:r>
-              <a:rPr lang="en-US" sz="1600" dirty="0">
-                <a:latin typeface="Courier New" panose="02070309020205020404" pitchFamily="49" charset="0"/>
-                <a:cs typeface="Courier New" panose="02070309020205020404" pitchFamily="49" charset="0"/>
-              </a:rPr>
-              <a:t> </a:t>
-            </a:r>
-            <a:r>
               <a:rPr lang="en-US" sz="1600" dirty="0" smtClean="0">
-                <a:latin typeface="Courier New" panose="02070309020205020404" pitchFamily="49" charset="0"/>
-                <a:cs typeface="Courier New" panose="02070309020205020404" pitchFamily="49" charset="0"/>
-              </a:rPr>
-              <a:t>    </a:t>
-            </a:r>
-            <a:r>
-              <a:rPr lang="en-US" sz="1600" b="1" dirty="0" smtClean="0">
-                <a:latin typeface="Courier New" panose="02070309020205020404" pitchFamily="49" charset="0"/>
-                <a:cs typeface="Courier New" panose="02070309020205020404" pitchFamily="49" charset="0"/>
-              </a:rPr>
-              <a:t>returns</a:t>
-            </a:r>
-            <a:r>
-              <a:rPr lang="en-US" sz="1600" dirty="0" smtClean="0">
-                <a:latin typeface="Courier New" panose="02070309020205020404" pitchFamily="49" charset="0"/>
-                <a:cs typeface="Courier New" panose="02070309020205020404" pitchFamily="49" charset="0"/>
-              </a:rPr>
-              <a:t> </a:t>
-            </a:r>
-            <a:r>
-              <a:rPr lang="en-US" sz="1600" dirty="0">
-                <a:latin typeface="Courier New" panose="02070309020205020404" pitchFamily="49" charset="0"/>
-                <a:cs typeface="Courier New" panose="02070309020205020404" pitchFamily="49" charset="0"/>
-              </a:rPr>
-              <a:t>(</a:t>
-            </a:r>
-            <a:r>
-              <a:rPr lang="en-US" sz="1600" dirty="0" err="1">
-                <a:latin typeface="Courier New" panose="02070309020205020404" pitchFamily="49" charset="0"/>
-                <a:cs typeface="Courier New" panose="02070309020205020404" pitchFamily="49" charset="0"/>
-              </a:rPr>
-              <a:t>doi_on</a:t>
-            </a:r>
-            <a:r>
-              <a:rPr lang="en-US" sz="1600" dirty="0">
-                <a:latin typeface="Courier New" panose="02070309020205020404" pitchFamily="49" charset="0"/>
-                <a:cs typeface="Courier New" panose="02070309020205020404" pitchFamily="49" charset="0"/>
-              </a:rPr>
-              <a:t>: </a:t>
-            </a:r>
-            <a:r>
-              <a:rPr lang="en-US" sz="1600" b="1" dirty="0">
-                <a:latin typeface="Courier New" panose="02070309020205020404" pitchFamily="49" charset="0"/>
-                <a:cs typeface="Courier New" panose="02070309020205020404" pitchFamily="49" charset="0"/>
-              </a:rPr>
-              <a:t>bool</a:t>
-            </a:r>
-            <a:r>
-              <a:rPr lang="en-US" sz="1600" dirty="0">
-                <a:latin typeface="Courier New" panose="02070309020205020404" pitchFamily="49" charset="0"/>
-                <a:cs typeface="Courier New" panose="02070309020205020404" pitchFamily="49" charset="0"/>
-              </a:rPr>
-              <a:t>);</a:t>
-            </a:r>
-          </a:p>
-          <a:p>
-            <a:pPr marL="0" indent="0">
-              <a:buNone/>
-            </a:pPr>
-            <a:r>
-              <a:rPr lang="en-US" sz="1600" dirty="0" smtClean="0">
-                <a:latin typeface="Courier New" panose="02070309020205020404" pitchFamily="49" charset="0"/>
+                <a:latin typeface="Consolas" panose="020B0609020204030204" pitchFamily="49" charset="0"/>
                 <a:cs typeface="Courier New" panose="02070309020205020404" pitchFamily="49" charset="0"/>
               </a:rPr>
               <a:t>     </a:t>
             </a:r>
             <a:r>
               <a:rPr lang="en-US" sz="1600" b="1" dirty="0" err="1" smtClean="0">
-                <a:latin typeface="Courier New" panose="02070309020205020404" pitchFamily="49" charset="0"/>
+                <a:latin typeface="Consolas" panose="020B0609020204030204" pitchFamily="49" charset="0"/>
                 <a:cs typeface="Courier New" panose="02070309020205020404" pitchFamily="49" charset="0"/>
               </a:rPr>
               <a:t>var</a:t>
             </a:r>
             <a:endParaRPr lang="en-US" sz="1600" b="1" dirty="0">
-              <a:latin typeface="Courier New" panose="02070309020205020404" pitchFamily="49" charset="0"/>
+              <a:latin typeface="Consolas" panose="020B0609020204030204" pitchFamily="49" charset="0"/>
               <a:cs typeface="Courier New" panose="02070309020205020404" pitchFamily="49" charset="0"/>
             </a:endParaRPr>
           </a:p>
           <a:p>
             <a:pPr marL="0" indent="0">
+              <a:lnSpc>
+                <a:spcPct val="120000"/>
+              </a:lnSpc>
               <a:buNone/>
             </a:pPr>
             <a:r>
               <a:rPr lang="en-US" sz="1600" dirty="0" smtClean="0">
-                <a:latin typeface="Courier New" panose="02070309020205020404" pitchFamily="49" charset="0"/>
-                <a:cs typeface="Courier New" panose="02070309020205020404" pitchFamily="49" charset="0"/>
-              </a:rPr>
-              <a:t>	a1_below</a:t>
+                <a:latin typeface="Consolas" panose="020B0609020204030204" pitchFamily="49" charset="0"/>
+                <a:cs typeface="Courier New" panose="02070309020205020404" pitchFamily="49" charset="0"/>
+              </a:rPr>
+              <a:t>	</a:t>
+            </a:r>
+            <a:r>
+              <a:rPr lang="en-US" sz="1600" dirty="0" smtClean="0">
+                <a:latin typeface="Consolas" panose="020B0609020204030204" pitchFamily="49" charset="0"/>
+                <a:cs typeface="Courier New" panose="02070309020205020404" pitchFamily="49" charset="0"/>
+              </a:rPr>
+              <a:t> a1_below</a:t>
             </a:r>
             <a:r>
               <a:rPr lang="en-US" sz="1600" dirty="0">
-                <a:latin typeface="Courier New" panose="02070309020205020404" pitchFamily="49" charset="0"/>
+                <a:latin typeface="Consolas" panose="020B0609020204030204" pitchFamily="49" charset="0"/>
                 <a:cs typeface="Courier New" panose="02070309020205020404" pitchFamily="49" charset="0"/>
               </a:rPr>
               <a:t>, a2_below, a1_above, a2_above,</a:t>
@@ -4503,46 +4529,56 @@
           </a:p>
           <a:p>
             <a:pPr marL="0" indent="0">
+              <a:lnSpc>
+                <a:spcPct val="120000"/>
+              </a:lnSpc>
               <a:buNone/>
             </a:pPr>
             <a:r>
               <a:rPr lang="en-US" sz="1600" dirty="0" smtClean="0">
-                <a:latin typeface="Courier New" panose="02070309020205020404" pitchFamily="49" charset="0"/>
-                <a:cs typeface="Courier New" panose="02070309020205020404" pitchFamily="49" charset="0"/>
-              </a:rPr>
-              <a:t>	below</a:t>
+                <a:latin typeface="Consolas" panose="020B0609020204030204" pitchFamily="49" charset="0"/>
+                <a:cs typeface="Courier New" panose="02070309020205020404" pitchFamily="49" charset="0"/>
+              </a:rPr>
+              <a:t>	</a:t>
+            </a:r>
+            <a:r>
+              <a:rPr lang="en-US" sz="1600" dirty="0" smtClean="0">
+                <a:latin typeface="Consolas" panose="020B0609020204030204" pitchFamily="49" charset="0"/>
+                <a:cs typeface="Courier New" panose="02070309020205020404" pitchFamily="49" charset="0"/>
+              </a:rPr>
+              <a:t> below</a:t>
             </a:r>
             <a:r>
               <a:rPr lang="en-US" sz="1600" dirty="0">
-                <a:latin typeface="Courier New" panose="02070309020205020404" pitchFamily="49" charset="0"/>
+                <a:latin typeface="Consolas" panose="020B0609020204030204" pitchFamily="49" charset="0"/>
                 <a:cs typeface="Courier New" panose="02070309020205020404" pitchFamily="49" charset="0"/>
               </a:rPr>
               <a:t>, </a:t>
             </a:r>
             <a:r>
               <a:rPr lang="en-US" sz="1600" dirty="0" err="1">
-                <a:latin typeface="Courier New" panose="02070309020205020404" pitchFamily="49" charset="0"/>
+                <a:latin typeface="Consolas" panose="020B0609020204030204" pitchFamily="49" charset="0"/>
                 <a:cs typeface="Courier New" panose="02070309020205020404" pitchFamily="49" charset="0"/>
               </a:rPr>
               <a:t>above_hyst</a:t>
             </a:r>
             <a:r>
               <a:rPr lang="en-US" sz="1600" dirty="0">
-                <a:latin typeface="Courier New" panose="02070309020205020404" pitchFamily="49" charset="0"/>
+                <a:latin typeface="Consolas" panose="020B0609020204030204" pitchFamily="49" charset="0"/>
                 <a:cs typeface="Courier New" panose="02070309020205020404" pitchFamily="49" charset="0"/>
               </a:rPr>
               <a:t>, d1, d2: </a:t>
             </a:r>
             <a:r>
               <a:rPr lang="en-US" sz="1600" b="1" dirty="0">
-                <a:latin typeface="Courier New" panose="02070309020205020404" pitchFamily="49" charset="0"/>
+                <a:latin typeface="Consolas" panose="020B0609020204030204" pitchFamily="49" charset="0"/>
                 <a:cs typeface="Courier New" panose="02070309020205020404" pitchFamily="49" charset="0"/>
               </a:rPr>
               <a:t>bool</a:t>
             </a:r>
             <a:r>
               <a:rPr lang="en-US" sz="1600" dirty="0">
-                <a:latin typeface="Courier New" panose="02070309020205020404" pitchFamily="49" charset="0"/>
+                <a:latin typeface="Consolas" panose="020B0609020204030204" pitchFamily="49" charset="0"/>
                 <a:cs typeface="Courier New" panose="02070309020205020404" pitchFamily="49" charset="0"/>
               </a:rPr>
               <a:t>;</a:t>
@@ -4550,737 +4586,1121 @@
           </a:p>
           <a:p>
             <a:pPr marL="0" indent="0">
+              <a:lnSpc>
+                <a:spcPct val="120000"/>
+              </a:lnSpc>
               <a:buNone/>
             </a:pPr>
             <a:r>
               <a:rPr lang="en-US" sz="1600" dirty="0">
-                <a:latin typeface="Courier New" panose="02070309020205020404" pitchFamily="49" charset="0"/>
+                <a:latin typeface="Consolas" panose="020B0609020204030204" pitchFamily="49" charset="0"/>
                 <a:cs typeface="Courier New" panose="02070309020205020404" pitchFamily="49" charset="0"/>
               </a:rPr>
               <a:t> </a:t>
             </a:r>
             <a:r>
               <a:rPr lang="en-US" sz="1600" dirty="0" smtClean="0">
-                <a:latin typeface="Courier New" panose="02070309020205020404" pitchFamily="49" charset="0"/>
+                <a:latin typeface="Consolas" panose="020B0609020204030204" pitchFamily="49" charset="0"/>
                 <a:cs typeface="Courier New" panose="02070309020205020404" pitchFamily="49" charset="0"/>
               </a:rPr>
               <a:t>    </a:t>
             </a:r>
             <a:r>
               <a:rPr lang="en-US" sz="1600" b="1" dirty="0" smtClean="0">
-                <a:latin typeface="Courier New" panose="02070309020205020404" pitchFamily="49" charset="0"/>
+                <a:latin typeface="Consolas" panose="020B0609020204030204" pitchFamily="49" charset="0"/>
                 <a:cs typeface="Courier New" panose="02070309020205020404" pitchFamily="49" charset="0"/>
               </a:rPr>
               <a:t>let</a:t>
             </a:r>
             <a:endParaRPr lang="en-US" sz="1600" b="1" dirty="0">
-              <a:latin typeface="Courier New" panose="02070309020205020404" pitchFamily="49" charset="0"/>
+              <a:latin typeface="Consolas" panose="020B0609020204030204" pitchFamily="49" charset="0"/>
               <a:cs typeface="Courier New" panose="02070309020205020404" pitchFamily="49" charset="0"/>
             </a:endParaRPr>
           </a:p>
           <a:p>
             <a:pPr marL="0" indent="0">
+              <a:lnSpc>
+                <a:spcPct val="120000"/>
+              </a:lnSpc>
               <a:buNone/>
             </a:pPr>
             <a:r>
               <a:rPr lang="en-US" sz="1600" dirty="0" smtClean="0">
-                <a:latin typeface="Courier New" panose="02070309020205020404" pitchFamily="49" charset="0"/>
-                <a:cs typeface="Courier New" panose="02070309020205020404" pitchFamily="49" charset="0"/>
-              </a:rPr>
-              <a:t>	a1_below </a:t>
+                <a:latin typeface="Consolas" panose="020B0609020204030204" pitchFamily="49" charset="0"/>
+                <a:cs typeface="Courier New" panose="02070309020205020404" pitchFamily="49" charset="0"/>
+              </a:rPr>
+              <a:t>	</a:t>
+            </a:r>
+            <a:r>
+              <a:rPr lang="en-US" sz="1600" dirty="0" smtClean="0">
+                <a:latin typeface="Consolas" panose="020B0609020204030204" pitchFamily="49" charset="0"/>
+                <a:cs typeface="Courier New" panose="02070309020205020404" pitchFamily="49" charset="0"/>
+              </a:rPr>
+              <a:t> a1_below </a:t>
             </a:r>
             <a:r>
               <a:rPr lang="en-US" sz="1600" dirty="0">
-                <a:latin typeface="Courier New" panose="02070309020205020404" pitchFamily="49" charset="0"/>
+                <a:latin typeface="Consolas" panose="020B0609020204030204" pitchFamily="49" charset="0"/>
                 <a:cs typeface="Courier New" panose="02070309020205020404" pitchFamily="49" charset="0"/>
               </a:rPr>
               <a:t>= (alt1 </a:t>
             </a:r>
             <a:r>
               <a:rPr lang="en-US" sz="1600" b="1" dirty="0">
-                <a:latin typeface="Courier New" panose="02070309020205020404" pitchFamily="49" charset="0"/>
+                <a:latin typeface="Consolas" panose="020B0609020204030204" pitchFamily="49" charset="0"/>
                 <a:cs typeface="Courier New" panose="02070309020205020404" pitchFamily="49" charset="0"/>
               </a:rPr>
               <a:t>&lt;</a:t>
             </a:r>
             <a:r>
               <a:rPr lang="en-US" sz="1600" dirty="0">
-                <a:latin typeface="Courier New" panose="02070309020205020404" pitchFamily="49" charset="0"/>
+                <a:latin typeface="Consolas" panose="020B0609020204030204" pitchFamily="49" charset="0"/>
                 <a:cs typeface="Courier New" panose="02070309020205020404" pitchFamily="49" charset="0"/>
               </a:rPr>
               <a:t> THRESHOLD); </a:t>
             </a:r>
             <a:r>
               <a:rPr lang="en-US" sz="1600" dirty="0" smtClean="0">
-                <a:latin typeface="Courier New" panose="02070309020205020404" pitchFamily="49" charset="0"/>
-                <a:cs typeface="Courier New" panose="02070309020205020404" pitchFamily="49" charset="0"/>
-              </a:rPr>
-              <a:t>        // </a:t>
+                <a:latin typeface="Consolas" panose="020B0609020204030204" pitchFamily="49" charset="0"/>
+                <a:cs typeface="Courier New" panose="02070309020205020404" pitchFamily="49" charset="0"/>
+              </a:rPr>
+              <a:t>       </a:t>
+            </a:r>
+            <a:endParaRPr lang="en-US" sz="1600" dirty="0">
+              <a:latin typeface="Consolas" panose="020B0609020204030204" pitchFamily="49" charset="0"/>
+              <a:cs typeface="Courier New" panose="02070309020205020404" pitchFamily="49" charset="0"/>
+            </a:endParaRPr>
+          </a:p>
+          <a:p>
+            <a:pPr marL="0" indent="0">
+              <a:lnSpc>
+                <a:spcPct val="120000"/>
+              </a:lnSpc>
+              <a:buNone/>
+            </a:pPr>
+            <a:r>
+              <a:rPr lang="en-US" sz="1600" dirty="0" smtClean="0">
+                <a:latin typeface="Consolas" panose="020B0609020204030204" pitchFamily="49" charset="0"/>
+                <a:cs typeface="Courier New" panose="02070309020205020404" pitchFamily="49" charset="0"/>
+              </a:rPr>
+              <a:t>	</a:t>
+            </a:r>
+            <a:r>
+              <a:rPr lang="en-US" sz="1600" dirty="0" smtClean="0">
+                <a:latin typeface="Consolas" panose="020B0609020204030204" pitchFamily="49" charset="0"/>
+                <a:cs typeface="Courier New" panose="02070309020205020404" pitchFamily="49" charset="0"/>
+              </a:rPr>
+              <a:t> a2_below </a:t>
             </a:r>
             <a:r>
               <a:rPr lang="en-US" sz="1600" dirty="0">
-                <a:latin typeface="Courier New" panose="02070309020205020404" pitchFamily="49" charset="0"/>
+                <a:latin typeface="Consolas" panose="020B0609020204030204" pitchFamily="49" charset="0"/>
+                <a:cs typeface="Courier New" panose="02070309020205020404" pitchFamily="49" charset="0"/>
+              </a:rPr>
+              <a:t>= (alt2 </a:t>
+            </a:r>
+            <a:r>
+              <a:rPr lang="en-US" sz="1600" b="1" dirty="0">
+                <a:latin typeface="Consolas" panose="020B0609020204030204" pitchFamily="49" charset="0"/>
+                <a:cs typeface="Courier New" panose="02070309020205020404" pitchFamily="49" charset="0"/>
+              </a:rPr>
+              <a:t>&lt;</a:t>
+            </a:r>
+            <a:r>
+              <a:rPr lang="en-US" sz="1600" dirty="0">
+                <a:latin typeface="Consolas" panose="020B0609020204030204" pitchFamily="49" charset="0"/>
+                <a:cs typeface="Courier New" panose="02070309020205020404" pitchFamily="49" charset="0"/>
+              </a:rPr>
+              <a:t> THRESHOLD); </a:t>
+            </a:r>
+            <a:r>
+              <a:rPr lang="en-US" sz="1600" dirty="0" smtClean="0">
+                <a:latin typeface="Consolas" panose="020B0609020204030204" pitchFamily="49" charset="0"/>
+                <a:cs typeface="Courier New" panose="02070309020205020404" pitchFamily="49" charset="0"/>
+              </a:rPr>
+              <a:t>  </a:t>
+            </a:r>
+            <a:endParaRPr lang="en-US" sz="1600" dirty="0">
+              <a:latin typeface="Consolas" panose="020B0609020204030204" pitchFamily="49" charset="0"/>
+              <a:cs typeface="Courier New" panose="02070309020205020404" pitchFamily="49" charset="0"/>
+            </a:endParaRPr>
+          </a:p>
+          <a:p>
+            <a:pPr marL="0" indent="0">
+              <a:lnSpc>
+                <a:spcPct val="120000"/>
+              </a:lnSpc>
+              <a:buNone/>
+            </a:pPr>
+            <a:r>
+              <a:rPr lang="en-US" sz="1600" dirty="0" smtClean="0">
+                <a:latin typeface="Consolas" panose="020B0609020204030204" pitchFamily="49" charset="0"/>
+                <a:cs typeface="Courier New" panose="02070309020205020404" pitchFamily="49" charset="0"/>
+              </a:rPr>
+              <a:t>	</a:t>
+            </a:r>
+            <a:r>
+              <a:rPr lang="en-US" sz="1600" dirty="0" smtClean="0">
+                <a:latin typeface="Consolas" panose="020B0609020204030204" pitchFamily="49" charset="0"/>
+                <a:cs typeface="Courier New" panose="02070309020205020404" pitchFamily="49" charset="0"/>
+              </a:rPr>
+              <a:t> a1_above </a:t>
+            </a:r>
+            <a:r>
+              <a:rPr lang="en-US" sz="1600" dirty="0">
+                <a:latin typeface="Consolas" panose="020B0609020204030204" pitchFamily="49" charset="0"/>
+                <a:cs typeface="Courier New" panose="02070309020205020404" pitchFamily="49" charset="0"/>
+              </a:rPr>
+              <a:t>= (alt1 </a:t>
+            </a:r>
+            <a:r>
+              <a:rPr lang="en-US" sz="1600" b="1" dirty="0">
+                <a:latin typeface="Consolas" panose="020B0609020204030204" pitchFamily="49" charset="0"/>
+                <a:cs typeface="Courier New" panose="02070309020205020404" pitchFamily="49" charset="0"/>
+              </a:rPr>
+              <a:t>&gt;=</a:t>
+            </a:r>
+            <a:r>
+              <a:rPr lang="en-US" sz="1600" dirty="0">
+                <a:latin typeface="Consolas" panose="020B0609020204030204" pitchFamily="49" charset="0"/>
+                <a:cs typeface="Courier New" panose="02070309020205020404" pitchFamily="49" charset="0"/>
+              </a:rPr>
+              <a:t> T_HYST); </a:t>
+            </a:r>
+            <a:r>
+              <a:rPr lang="en-US" sz="1600" dirty="0" smtClean="0">
+                <a:latin typeface="Consolas" panose="020B0609020204030204" pitchFamily="49" charset="0"/>
+                <a:cs typeface="Courier New" panose="02070309020205020404" pitchFamily="49" charset="0"/>
+              </a:rPr>
+              <a:t>    </a:t>
+            </a:r>
+            <a:endParaRPr lang="en-US" sz="1600" dirty="0">
+              <a:latin typeface="Consolas" panose="020B0609020204030204" pitchFamily="49" charset="0"/>
+              <a:cs typeface="Courier New" panose="02070309020205020404" pitchFamily="49" charset="0"/>
+            </a:endParaRPr>
+          </a:p>
+          <a:p>
+            <a:pPr marL="0" indent="0">
+              <a:lnSpc>
+                <a:spcPct val="120000"/>
+              </a:lnSpc>
+              <a:buNone/>
+            </a:pPr>
+            <a:r>
+              <a:rPr lang="en-US" sz="1600" dirty="0" smtClean="0">
+                <a:latin typeface="Consolas" panose="020B0609020204030204" pitchFamily="49" charset="0"/>
+                <a:cs typeface="Courier New" panose="02070309020205020404" pitchFamily="49" charset="0"/>
+              </a:rPr>
+              <a:t>	</a:t>
+            </a:r>
+            <a:r>
+              <a:rPr lang="en-US" sz="1600" dirty="0" smtClean="0">
+                <a:latin typeface="Consolas" panose="020B0609020204030204" pitchFamily="49" charset="0"/>
+                <a:cs typeface="Courier New" panose="02070309020205020404" pitchFamily="49" charset="0"/>
+              </a:rPr>
+              <a:t> a2_above </a:t>
+            </a:r>
+            <a:r>
+              <a:rPr lang="en-US" sz="1600" dirty="0">
+                <a:latin typeface="Consolas" panose="020B0609020204030204" pitchFamily="49" charset="0"/>
+                <a:cs typeface="Courier New" panose="02070309020205020404" pitchFamily="49" charset="0"/>
+              </a:rPr>
+              <a:t>= (alt2 </a:t>
+            </a:r>
+            <a:r>
+              <a:rPr lang="en-US" sz="1600" b="1" dirty="0">
+                <a:latin typeface="Consolas" panose="020B0609020204030204" pitchFamily="49" charset="0"/>
+                <a:cs typeface="Courier New" panose="02070309020205020404" pitchFamily="49" charset="0"/>
+              </a:rPr>
+              <a:t>&gt;=</a:t>
+            </a:r>
+            <a:r>
+              <a:rPr lang="en-US" sz="1600" dirty="0">
+                <a:latin typeface="Consolas" panose="020B0609020204030204" pitchFamily="49" charset="0"/>
+                <a:cs typeface="Courier New" panose="02070309020205020404" pitchFamily="49" charset="0"/>
+              </a:rPr>
+              <a:t> T_HYST</a:t>
+            </a:r>
+            <a:r>
+              <a:rPr lang="en-US" sz="1600" dirty="0" smtClean="0">
+                <a:latin typeface="Consolas" panose="020B0609020204030204" pitchFamily="49" charset="0"/>
+                <a:cs typeface="Courier New" panose="02070309020205020404" pitchFamily="49" charset="0"/>
+              </a:rPr>
+              <a:t>);</a:t>
+            </a:r>
+          </a:p>
+          <a:p>
+            <a:pPr marL="0" indent="0">
+              <a:lnSpc>
+                <a:spcPct val="120000"/>
+              </a:lnSpc>
+              <a:buNone/>
+            </a:pPr>
+            <a:r>
+              <a:rPr lang="en-US" sz="1600" dirty="0" smtClean="0">
+                <a:latin typeface="Consolas" panose="020B0609020204030204" pitchFamily="49" charset="0"/>
+                <a:cs typeface="Courier New" panose="02070309020205020404" pitchFamily="49" charset="0"/>
+              </a:rPr>
+              <a:t>	</a:t>
+            </a:r>
+            <a:r>
+              <a:rPr lang="en-US" sz="1600" dirty="0" smtClean="0">
+                <a:latin typeface="Consolas" panose="020B0609020204030204" pitchFamily="49" charset="0"/>
+                <a:cs typeface="Courier New" panose="02070309020205020404" pitchFamily="49" charset="0"/>
+              </a:rPr>
+              <a:t> below </a:t>
+            </a:r>
+            <a:r>
+              <a:rPr lang="en-US" sz="1600" dirty="0">
+                <a:latin typeface="Consolas" panose="020B0609020204030204" pitchFamily="49" charset="0"/>
+                <a:cs typeface="Courier New" panose="02070309020205020404" pitchFamily="49" charset="0"/>
+              </a:rPr>
+              <a:t>= a1_below</a:t>
+            </a:r>
+            <a:r>
+              <a:rPr lang="en-US" sz="1600" b="1" dirty="0">
+                <a:latin typeface="Consolas" panose="020B0609020204030204" pitchFamily="49" charset="0"/>
+                <a:cs typeface="Courier New" panose="02070309020205020404" pitchFamily="49" charset="0"/>
+              </a:rPr>
+              <a:t> or </a:t>
+            </a:r>
+            <a:r>
+              <a:rPr lang="en-US" sz="1600" dirty="0">
+                <a:latin typeface="Consolas" panose="020B0609020204030204" pitchFamily="49" charset="0"/>
+                <a:cs typeface="Courier New" panose="02070309020205020404" pitchFamily="49" charset="0"/>
+              </a:rPr>
+              <a:t>a2_below; </a:t>
+            </a:r>
+            <a:r>
+              <a:rPr lang="en-US" sz="1600" dirty="0" smtClean="0">
+                <a:latin typeface="Consolas" panose="020B0609020204030204" pitchFamily="49" charset="0"/>
+                <a:cs typeface="Courier New" panose="02070309020205020404" pitchFamily="49" charset="0"/>
+              </a:rPr>
+              <a:t>        </a:t>
+            </a:r>
+            <a:endParaRPr lang="en-US" sz="1600" dirty="0">
+              <a:latin typeface="Consolas" panose="020B0609020204030204" pitchFamily="49" charset="0"/>
+              <a:cs typeface="Courier New" panose="02070309020205020404" pitchFamily="49" charset="0"/>
+            </a:endParaRPr>
+          </a:p>
+          <a:p>
+            <a:pPr marL="0" indent="0">
+              <a:lnSpc>
+                <a:spcPct val="120000"/>
+              </a:lnSpc>
+              <a:buNone/>
+            </a:pPr>
+            <a:r>
+              <a:rPr lang="en-US" sz="1600" dirty="0" smtClean="0">
+                <a:latin typeface="Consolas" panose="020B0609020204030204" pitchFamily="49" charset="0"/>
+                <a:cs typeface="Courier New" panose="02070309020205020404" pitchFamily="49" charset="0"/>
+              </a:rPr>
+              <a:t>	</a:t>
+            </a:r>
+            <a:r>
+              <a:rPr lang="en-US" sz="1600" dirty="0" smtClean="0">
+                <a:latin typeface="Consolas" panose="020B0609020204030204" pitchFamily="49" charset="0"/>
+                <a:cs typeface="Courier New" panose="02070309020205020404" pitchFamily="49" charset="0"/>
+              </a:rPr>
+              <a:t> </a:t>
+            </a:r>
+            <a:r>
+              <a:rPr lang="en-US" sz="1600" dirty="0" err="1" smtClean="0">
+                <a:latin typeface="Consolas" panose="020B0609020204030204" pitchFamily="49" charset="0"/>
+                <a:cs typeface="Courier New" panose="02070309020205020404" pitchFamily="49" charset="0"/>
+              </a:rPr>
+              <a:t>above_hyst</a:t>
+            </a:r>
+            <a:r>
+              <a:rPr lang="en-US" sz="1600" dirty="0" smtClean="0">
+                <a:latin typeface="Consolas" panose="020B0609020204030204" pitchFamily="49" charset="0"/>
+                <a:cs typeface="Courier New" panose="02070309020205020404" pitchFamily="49" charset="0"/>
+              </a:rPr>
+              <a:t> </a:t>
+            </a:r>
+            <a:r>
+              <a:rPr lang="en-US" sz="1600" dirty="0">
+                <a:latin typeface="Consolas" panose="020B0609020204030204" pitchFamily="49" charset="0"/>
+                <a:cs typeface="Courier New" panose="02070309020205020404" pitchFamily="49" charset="0"/>
+              </a:rPr>
+              <a:t>= a1_above </a:t>
+            </a:r>
+            <a:r>
+              <a:rPr lang="en-US" sz="1600" b="1" dirty="0">
+                <a:latin typeface="Consolas" panose="020B0609020204030204" pitchFamily="49" charset="0"/>
+                <a:cs typeface="Courier New" panose="02070309020205020404" pitchFamily="49" charset="0"/>
+              </a:rPr>
+              <a:t>and</a:t>
+            </a:r>
+            <a:r>
+              <a:rPr lang="en-US" sz="1600" dirty="0">
+                <a:latin typeface="Consolas" panose="020B0609020204030204" pitchFamily="49" charset="0"/>
+                <a:cs typeface="Courier New" panose="02070309020205020404" pitchFamily="49" charset="0"/>
+              </a:rPr>
+              <a:t> a2_above; </a:t>
+            </a:r>
+            <a:r>
+              <a:rPr lang="en-US" sz="1600" dirty="0" smtClean="0">
+                <a:latin typeface="Consolas" panose="020B0609020204030204" pitchFamily="49" charset="0"/>
+                <a:cs typeface="Courier New" panose="02070309020205020404" pitchFamily="49" charset="0"/>
+              </a:rPr>
+              <a:t>   </a:t>
+            </a:r>
+            <a:endParaRPr lang="en-US" sz="1600" dirty="0">
+              <a:latin typeface="Consolas" panose="020B0609020204030204" pitchFamily="49" charset="0"/>
+              <a:cs typeface="Courier New" panose="02070309020205020404" pitchFamily="49" charset="0"/>
+            </a:endParaRPr>
+          </a:p>
+          <a:p>
+            <a:pPr marL="0" indent="0">
+              <a:lnSpc>
+                <a:spcPct val="120000"/>
+              </a:lnSpc>
+              <a:buNone/>
+            </a:pPr>
+            <a:r>
+              <a:rPr lang="en-US" sz="1600" dirty="0" smtClean="0">
+                <a:latin typeface="Consolas" panose="020B0609020204030204" pitchFamily="49" charset="0"/>
+                <a:cs typeface="Courier New" panose="02070309020205020404" pitchFamily="49" charset="0"/>
+              </a:rPr>
+              <a:t>	</a:t>
+            </a:r>
+            <a:r>
+              <a:rPr lang="en-US" sz="1600" dirty="0" smtClean="0">
+                <a:latin typeface="Consolas" panose="020B0609020204030204" pitchFamily="49" charset="0"/>
+                <a:cs typeface="Courier New" panose="02070309020205020404" pitchFamily="49" charset="0"/>
+              </a:rPr>
+              <a:t> </a:t>
+            </a:r>
+            <a:r>
+              <a:rPr lang="en-US" sz="1600" dirty="0" err="1" smtClean="0">
+                <a:latin typeface="Consolas" panose="020B0609020204030204" pitchFamily="49" charset="0"/>
+                <a:cs typeface="Courier New" panose="02070309020205020404" pitchFamily="49" charset="0"/>
+              </a:rPr>
+              <a:t>doi_on</a:t>
+            </a:r>
+            <a:r>
+              <a:rPr lang="en-US" sz="1600" dirty="0" smtClean="0">
+                <a:latin typeface="Consolas" panose="020B0609020204030204" pitchFamily="49" charset="0"/>
+                <a:cs typeface="Courier New" panose="02070309020205020404" pitchFamily="49" charset="0"/>
+              </a:rPr>
+              <a:t> </a:t>
+            </a:r>
+            <a:r>
+              <a:rPr lang="en-US" sz="1600" dirty="0">
+                <a:latin typeface="Consolas" panose="020B0609020204030204" pitchFamily="49" charset="0"/>
+                <a:cs typeface="Courier New" panose="02070309020205020404" pitchFamily="49" charset="0"/>
+              </a:rPr>
+              <a:t>= </a:t>
+            </a:r>
+            <a:r>
+              <a:rPr lang="en-US" sz="1600" b="1" dirty="0">
+                <a:latin typeface="Consolas" panose="020B0609020204030204" pitchFamily="49" charset="0"/>
+                <a:cs typeface="Courier New" panose="02070309020205020404" pitchFamily="49" charset="0"/>
+              </a:rPr>
+              <a:t>if</a:t>
+            </a:r>
+            <a:r>
+              <a:rPr lang="en-US" sz="1600" dirty="0">
+                <a:latin typeface="Consolas" panose="020B0609020204030204" pitchFamily="49" charset="0"/>
+                <a:cs typeface="Courier New" panose="02070309020205020404" pitchFamily="49" charset="0"/>
+              </a:rPr>
+              <a:t> (below </a:t>
+            </a:r>
+            <a:r>
+              <a:rPr lang="en-US" sz="1600" b="1" dirty="0">
+                <a:latin typeface="Consolas" panose="020B0609020204030204" pitchFamily="49" charset="0"/>
+                <a:cs typeface="Courier New" panose="02070309020205020404" pitchFamily="49" charset="0"/>
+              </a:rPr>
+              <a:t>and</a:t>
+            </a:r>
+            <a:r>
+              <a:rPr lang="en-US" sz="1600" dirty="0">
+                <a:latin typeface="Consolas" panose="020B0609020204030204" pitchFamily="49" charset="0"/>
+                <a:cs typeface="Courier New" panose="02070309020205020404" pitchFamily="49" charset="0"/>
+              </a:rPr>
+              <a:t> </a:t>
+            </a:r>
+            <a:r>
+              <a:rPr lang="en-US" sz="1600" b="1" dirty="0">
+                <a:latin typeface="Consolas" panose="020B0609020204030204" pitchFamily="49" charset="0"/>
+                <a:cs typeface="Courier New" panose="02070309020205020404" pitchFamily="49" charset="0"/>
+              </a:rPr>
+              <a:t>not</a:t>
+            </a:r>
+            <a:r>
+              <a:rPr lang="en-US" sz="1600" dirty="0">
+                <a:latin typeface="Consolas" panose="020B0609020204030204" pitchFamily="49" charset="0"/>
+                <a:cs typeface="Courier New" panose="02070309020205020404" pitchFamily="49" charset="0"/>
+              </a:rPr>
+              <a:t> </a:t>
+            </a:r>
+            <a:r>
+              <a:rPr lang="en-US" sz="1600" dirty="0" smtClean="0">
+                <a:latin typeface="Consolas" panose="020B0609020204030204" pitchFamily="49" charset="0"/>
+                <a:cs typeface="Courier New" panose="02070309020205020404" pitchFamily="49" charset="0"/>
+              </a:rPr>
+              <a:t>inhibit)</a:t>
+            </a:r>
+            <a:br>
+              <a:rPr lang="en-US" sz="1600" dirty="0" smtClean="0">
+                <a:latin typeface="Consolas" panose="020B0609020204030204" pitchFamily="49" charset="0"/>
+                <a:cs typeface="Courier New" panose="02070309020205020404" pitchFamily="49" charset="0"/>
+              </a:rPr>
+            </a:br>
+            <a:r>
+              <a:rPr lang="en-US" sz="1600" dirty="0" smtClean="0">
+                <a:latin typeface="Consolas" panose="020B0609020204030204" pitchFamily="49" charset="0"/>
+                <a:cs typeface="Courier New" panose="02070309020205020404" pitchFamily="49" charset="0"/>
+              </a:rPr>
+              <a:t>                  </a:t>
+            </a:r>
+            <a:r>
+              <a:rPr lang="en-US" sz="1600" b="1" dirty="0" smtClean="0">
+                <a:latin typeface="Consolas" panose="020B0609020204030204" pitchFamily="49" charset="0"/>
+                <a:cs typeface="Courier New" panose="02070309020205020404" pitchFamily="49" charset="0"/>
+              </a:rPr>
+              <a:t>then</a:t>
+            </a:r>
+            <a:r>
+              <a:rPr lang="en-US" sz="1600" dirty="0" smtClean="0">
+                <a:latin typeface="Consolas" panose="020B0609020204030204" pitchFamily="49" charset="0"/>
+                <a:cs typeface="Courier New" panose="02070309020205020404" pitchFamily="49" charset="0"/>
+              </a:rPr>
+              <a:t> </a:t>
+            </a:r>
+            <a:r>
+              <a:rPr lang="en-US" sz="1600" i="1" dirty="0">
+                <a:latin typeface="Consolas" panose="020B0609020204030204" pitchFamily="49" charset="0"/>
+                <a:cs typeface="Courier New" panose="02070309020205020404" pitchFamily="49" charset="0"/>
+              </a:rPr>
+              <a:t>true</a:t>
+            </a:r>
+            <a:r>
+              <a:rPr lang="en-US" sz="1600" dirty="0">
+                <a:latin typeface="Consolas" panose="020B0609020204030204" pitchFamily="49" charset="0"/>
+                <a:cs typeface="Courier New" panose="02070309020205020404" pitchFamily="49" charset="0"/>
+              </a:rPr>
+              <a:t> </a:t>
+            </a:r>
+            <a:r>
+              <a:rPr lang="en-US" sz="1600" b="1" dirty="0">
+                <a:latin typeface="Consolas" panose="020B0609020204030204" pitchFamily="49" charset="0"/>
+                <a:cs typeface="Courier New" panose="02070309020205020404" pitchFamily="49" charset="0"/>
+              </a:rPr>
+              <a:t>else</a:t>
+            </a:r>
+            <a:r>
+              <a:rPr lang="en-US" sz="1600" dirty="0">
+                <a:latin typeface="Consolas" panose="020B0609020204030204" pitchFamily="49" charset="0"/>
+                <a:cs typeface="Courier New" panose="02070309020205020404" pitchFamily="49" charset="0"/>
+              </a:rPr>
+              <a:t> d1;</a:t>
+            </a:r>
+          </a:p>
+          <a:p>
+            <a:pPr marL="0" indent="0">
+              <a:lnSpc>
+                <a:spcPct val="120000"/>
+              </a:lnSpc>
+              <a:buNone/>
+            </a:pPr>
+            <a:r>
+              <a:rPr lang="en-US" sz="1600" dirty="0" smtClean="0">
+                <a:latin typeface="Consolas" panose="020B0609020204030204" pitchFamily="49" charset="0"/>
+                <a:cs typeface="Courier New" panose="02070309020205020404" pitchFamily="49" charset="0"/>
+              </a:rPr>
+              <a:t>	</a:t>
+            </a:r>
+            <a:r>
+              <a:rPr lang="en-US" sz="1600" dirty="0" smtClean="0">
+                <a:latin typeface="Consolas" panose="020B0609020204030204" pitchFamily="49" charset="0"/>
+                <a:cs typeface="Courier New" panose="02070309020205020404" pitchFamily="49" charset="0"/>
+              </a:rPr>
+              <a:t> d1 </a:t>
+            </a:r>
+            <a:r>
+              <a:rPr lang="en-US" sz="1600" dirty="0">
+                <a:latin typeface="Consolas" panose="020B0609020204030204" pitchFamily="49" charset="0"/>
+                <a:cs typeface="Courier New" panose="02070309020205020404" pitchFamily="49" charset="0"/>
+              </a:rPr>
+              <a:t>= </a:t>
+            </a:r>
+            <a:r>
+              <a:rPr lang="en-US" sz="1600" b="1" dirty="0">
+                <a:latin typeface="Consolas" panose="020B0609020204030204" pitchFamily="49" charset="0"/>
+                <a:cs typeface="Courier New" panose="02070309020205020404" pitchFamily="49" charset="0"/>
+              </a:rPr>
+              <a:t>if</a:t>
+            </a:r>
+            <a:r>
+              <a:rPr lang="en-US" sz="1600" dirty="0">
+                <a:latin typeface="Consolas" panose="020B0609020204030204" pitchFamily="49" charset="0"/>
+                <a:cs typeface="Courier New" panose="02070309020205020404" pitchFamily="49" charset="0"/>
+              </a:rPr>
+              <a:t> (inhibit </a:t>
+            </a:r>
+            <a:r>
+              <a:rPr lang="en-US" sz="1600" b="1" dirty="0">
+                <a:latin typeface="Consolas" panose="020B0609020204030204" pitchFamily="49" charset="0"/>
+                <a:cs typeface="Courier New" panose="02070309020205020404" pitchFamily="49" charset="0"/>
+              </a:rPr>
+              <a:t>or</a:t>
+            </a:r>
+            <a:r>
+              <a:rPr lang="en-US" sz="1600" dirty="0">
+                <a:latin typeface="Consolas" panose="020B0609020204030204" pitchFamily="49" charset="0"/>
+                <a:cs typeface="Courier New" panose="02070309020205020404" pitchFamily="49" charset="0"/>
+              </a:rPr>
+              <a:t> </a:t>
+            </a:r>
+            <a:r>
+              <a:rPr lang="en-US" sz="1600" dirty="0" err="1" smtClean="0">
+                <a:latin typeface="Consolas" panose="020B0609020204030204" pitchFamily="49" charset="0"/>
+                <a:cs typeface="Courier New" panose="02070309020205020404" pitchFamily="49" charset="0"/>
+              </a:rPr>
+              <a:t>above_hyst</a:t>
+            </a:r>
+            <a:r>
+              <a:rPr lang="en-US" sz="1600" dirty="0" smtClean="0">
+                <a:latin typeface="Consolas" panose="020B0609020204030204" pitchFamily="49" charset="0"/>
+                <a:cs typeface="Courier New" panose="02070309020205020404" pitchFamily="49" charset="0"/>
+              </a:rPr>
+              <a:t>)</a:t>
+            </a:r>
+            <a:br>
+              <a:rPr lang="en-US" sz="1600" dirty="0" smtClean="0">
+                <a:latin typeface="Consolas" panose="020B0609020204030204" pitchFamily="49" charset="0"/>
+                <a:cs typeface="Courier New" panose="02070309020205020404" pitchFamily="49" charset="0"/>
+              </a:rPr>
+            </a:br>
+            <a:r>
+              <a:rPr lang="en-US" sz="1600" dirty="0" smtClean="0">
+                <a:latin typeface="Consolas" panose="020B0609020204030204" pitchFamily="49" charset="0"/>
+                <a:cs typeface="Courier New" panose="02070309020205020404" pitchFamily="49" charset="0"/>
+              </a:rPr>
+              <a:t>              </a:t>
+            </a:r>
+            <a:r>
+              <a:rPr lang="en-US" sz="1600" b="1" dirty="0" smtClean="0">
+                <a:latin typeface="Consolas" panose="020B0609020204030204" pitchFamily="49" charset="0"/>
+                <a:cs typeface="Courier New" panose="02070309020205020404" pitchFamily="49" charset="0"/>
+              </a:rPr>
+              <a:t>then</a:t>
+            </a:r>
+            <a:r>
+              <a:rPr lang="en-US" sz="1600" dirty="0" smtClean="0">
+                <a:latin typeface="Consolas" panose="020B0609020204030204" pitchFamily="49" charset="0"/>
+                <a:cs typeface="Courier New" panose="02070309020205020404" pitchFamily="49" charset="0"/>
+              </a:rPr>
+              <a:t> </a:t>
+            </a:r>
+            <a:r>
+              <a:rPr lang="en-US" sz="1600" i="1" dirty="0">
+                <a:latin typeface="Consolas" panose="020B0609020204030204" pitchFamily="49" charset="0"/>
+                <a:cs typeface="Courier New" panose="02070309020205020404" pitchFamily="49" charset="0"/>
+              </a:rPr>
+              <a:t>false</a:t>
+            </a:r>
+            <a:r>
+              <a:rPr lang="en-US" sz="1600" dirty="0">
+                <a:latin typeface="Consolas" panose="020B0609020204030204" pitchFamily="49" charset="0"/>
+                <a:cs typeface="Courier New" panose="02070309020205020404" pitchFamily="49" charset="0"/>
+              </a:rPr>
+              <a:t> </a:t>
+            </a:r>
+            <a:r>
+              <a:rPr lang="en-US" sz="1600" b="1" dirty="0">
+                <a:latin typeface="Consolas" panose="020B0609020204030204" pitchFamily="49" charset="0"/>
+                <a:cs typeface="Courier New" panose="02070309020205020404" pitchFamily="49" charset="0"/>
+              </a:rPr>
+              <a:t>else</a:t>
+            </a:r>
+            <a:r>
+              <a:rPr lang="en-US" sz="1600" dirty="0">
+                <a:latin typeface="Consolas" panose="020B0609020204030204" pitchFamily="49" charset="0"/>
+                <a:cs typeface="Courier New" panose="02070309020205020404" pitchFamily="49" charset="0"/>
+              </a:rPr>
+              <a:t> d2;</a:t>
+            </a:r>
+          </a:p>
+          <a:p>
+            <a:pPr marL="0" indent="0">
+              <a:lnSpc>
+                <a:spcPct val="120000"/>
+              </a:lnSpc>
+              <a:buNone/>
+            </a:pPr>
+            <a:r>
+              <a:rPr lang="en-US" sz="1600" dirty="0" smtClean="0">
+                <a:latin typeface="Consolas" panose="020B0609020204030204" pitchFamily="49" charset="0"/>
+                <a:cs typeface="Courier New" panose="02070309020205020404" pitchFamily="49" charset="0"/>
+              </a:rPr>
+              <a:t>	</a:t>
+            </a:r>
+            <a:r>
+              <a:rPr lang="en-US" sz="1600" dirty="0" smtClean="0">
+                <a:latin typeface="Consolas" panose="020B0609020204030204" pitchFamily="49" charset="0"/>
+                <a:cs typeface="Courier New" panose="02070309020205020404" pitchFamily="49" charset="0"/>
+              </a:rPr>
+              <a:t> d2 </a:t>
+            </a:r>
+            <a:r>
+              <a:rPr lang="en-US" sz="1600" dirty="0">
+                <a:latin typeface="Consolas" panose="020B0609020204030204" pitchFamily="49" charset="0"/>
+                <a:cs typeface="Courier New" panose="02070309020205020404" pitchFamily="49" charset="0"/>
+              </a:rPr>
+              <a:t>= (</a:t>
+            </a:r>
+            <a:r>
+              <a:rPr lang="en-US" sz="1600" i="1" dirty="0">
+                <a:latin typeface="Consolas" panose="020B0609020204030204" pitchFamily="49" charset="0"/>
+                <a:cs typeface="Courier New" panose="02070309020205020404" pitchFamily="49" charset="0"/>
+              </a:rPr>
+              <a:t>false</a:t>
+            </a:r>
+            <a:r>
+              <a:rPr lang="en-US" sz="1600" dirty="0">
+                <a:latin typeface="Consolas" panose="020B0609020204030204" pitchFamily="49" charset="0"/>
+                <a:cs typeface="Courier New" panose="02070309020205020404" pitchFamily="49" charset="0"/>
+              </a:rPr>
+              <a:t> </a:t>
+            </a:r>
+            <a:r>
+              <a:rPr lang="en-US" sz="1600" b="1" dirty="0">
+                <a:latin typeface="Consolas" panose="020B0609020204030204" pitchFamily="49" charset="0"/>
+                <a:cs typeface="Courier New" panose="02070309020205020404" pitchFamily="49" charset="0"/>
+              </a:rPr>
+              <a:t>-&gt;</a:t>
+            </a:r>
+            <a:r>
+              <a:rPr lang="en-US" sz="1600" dirty="0">
+                <a:latin typeface="Consolas" panose="020B0609020204030204" pitchFamily="49" charset="0"/>
+                <a:cs typeface="Courier New" panose="02070309020205020404" pitchFamily="49" charset="0"/>
+              </a:rPr>
+              <a:t> </a:t>
+            </a:r>
+            <a:r>
+              <a:rPr lang="en-US" sz="1600" i="1" dirty="0">
+                <a:latin typeface="Consolas" panose="020B0609020204030204" pitchFamily="49" charset="0"/>
+                <a:cs typeface="Courier New" panose="02070309020205020404" pitchFamily="49" charset="0"/>
+              </a:rPr>
+              <a:t>pre</a:t>
+            </a:r>
+            <a:r>
+              <a:rPr lang="en-US" sz="1600" dirty="0">
+                <a:latin typeface="Consolas" panose="020B0609020204030204" pitchFamily="49" charset="0"/>
+                <a:cs typeface="Courier New" panose="02070309020205020404" pitchFamily="49" charset="0"/>
+              </a:rPr>
+              <a:t>(</a:t>
+            </a:r>
+            <a:r>
+              <a:rPr lang="en-US" sz="1600" dirty="0" err="1">
+                <a:latin typeface="Consolas" panose="020B0609020204030204" pitchFamily="49" charset="0"/>
+                <a:cs typeface="Courier New" panose="02070309020205020404" pitchFamily="49" charset="0"/>
+              </a:rPr>
+              <a:t>doi_on</a:t>
+            </a:r>
+            <a:r>
+              <a:rPr lang="en-US" sz="1600" dirty="0">
+                <a:latin typeface="Consolas" panose="020B0609020204030204" pitchFamily="49" charset="0"/>
+                <a:cs typeface="Courier New" panose="02070309020205020404" pitchFamily="49" charset="0"/>
+              </a:rPr>
+              <a:t>)); </a:t>
+            </a:r>
+            <a:r>
+              <a:rPr lang="en-US" sz="1600" dirty="0" smtClean="0">
+                <a:latin typeface="Consolas" panose="020B0609020204030204" pitchFamily="49" charset="0"/>
+                <a:cs typeface="Courier New" panose="02070309020205020404" pitchFamily="49" charset="0"/>
+              </a:rPr>
+              <a:t>         </a:t>
+            </a:r>
+            <a:endParaRPr lang="en-US" sz="1600" dirty="0">
+              <a:latin typeface="Consolas" panose="020B0609020204030204" pitchFamily="49" charset="0"/>
+              <a:cs typeface="Courier New" panose="02070309020205020404" pitchFamily="49" charset="0"/>
+            </a:endParaRPr>
+          </a:p>
+          <a:p>
+            <a:pPr marL="0" indent="0">
+              <a:lnSpc>
+                <a:spcPct val="120000"/>
+              </a:lnSpc>
+              <a:buNone/>
+            </a:pPr>
+            <a:r>
+              <a:rPr lang="en-US" sz="1600" dirty="0">
+                <a:latin typeface="Consolas" panose="020B0609020204030204" pitchFamily="49" charset="0"/>
+                <a:cs typeface="Courier New" panose="02070309020205020404" pitchFamily="49" charset="0"/>
+              </a:rPr>
+              <a:t> </a:t>
+            </a:r>
+            <a:r>
+              <a:rPr lang="en-US" sz="1600" dirty="0" smtClean="0">
+                <a:latin typeface="Consolas" panose="020B0609020204030204" pitchFamily="49" charset="0"/>
+                <a:cs typeface="Courier New" panose="02070309020205020404" pitchFamily="49" charset="0"/>
+              </a:rPr>
+              <a:t>    </a:t>
+            </a:r>
+            <a:r>
+              <a:rPr lang="en-US" sz="1600" b="1" dirty="0" err="1" smtClean="0">
+                <a:latin typeface="Consolas" panose="020B0609020204030204" pitchFamily="49" charset="0"/>
+                <a:cs typeface="Courier New" panose="02070309020205020404" pitchFamily="49" charset="0"/>
+              </a:rPr>
+              <a:t>tel</a:t>
+            </a:r>
+            <a:r>
+              <a:rPr lang="en-US" sz="1600" dirty="0">
+                <a:latin typeface="Consolas" panose="020B0609020204030204" pitchFamily="49" charset="0"/>
+                <a:cs typeface="Courier New" panose="02070309020205020404" pitchFamily="49" charset="0"/>
+              </a:rPr>
+              <a:t>;</a:t>
+            </a:r>
+          </a:p>
+        </p:txBody>
+      </p:sp>
+      <p:sp>
+        <p:nvSpPr>
+          <p:cNvPr id="2" name="Rectangle 1"/>
+          <p:cNvSpPr/>
+          <p:nvPr/>
+        </p:nvSpPr>
+        <p:spPr>
+          <a:xfrm>
+            <a:off x="1709256" y="2666768"/>
+            <a:ext cx="633507" cy="4368375"/>
+          </a:xfrm>
+          <a:prstGeom prst="rect">
+            <a:avLst/>
+          </a:prstGeom>
+        </p:spPr>
+        <p:txBody>
+          <a:bodyPr wrap="none">
+            <a:spAutoFit/>
+          </a:bodyPr>
+          <a:lstStyle/>
+          <a:p>
+            <a:pPr>
+              <a:lnSpc>
+                <a:spcPct val="120000"/>
+              </a:lnSpc>
+              <a:spcBef>
+                <a:spcPts val="1000"/>
+              </a:spcBef>
+            </a:pPr>
+            <a:r>
+              <a:rPr lang="en-US" sz="1600" b="1" dirty="0" smtClean="0">
+                <a:latin typeface="Consolas" panose="020B0609020204030204" pitchFamily="49" charset="0"/>
+                <a:cs typeface="Courier New" panose="02070309020205020404" pitchFamily="49" charset="0"/>
+              </a:rPr>
+              <a:t> </a:t>
+            </a:r>
+            <a:r>
+              <a:rPr lang="en-US" sz="1600" b="1" dirty="0" smtClean="0">
+                <a:latin typeface="Consolas" panose="020B0609020204030204" pitchFamily="49" charset="0"/>
                 <a:cs typeface="Courier New" panose="02070309020205020404" pitchFamily="49" charset="0"/>
               </a:rPr>
               <a:t>(1)</a:t>
             </a:r>
-          </a:p>
-          <a:p>
-            <a:pPr marL="0" indent="0">
-              <a:buNone/>
+            <a:endParaRPr lang="en-US" sz="1600" b="1" dirty="0" smtClean="0">
+              <a:latin typeface="Consolas" panose="020B0609020204030204" pitchFamily="49" charset="0"/>
+              <a:cs typeface="Courier New" panose="02070309020205020404" pitchFamily="49" charset="0"/>
+            </a:endParaRPr>
+          </a:p>
+          <a:p>
+            <a:pPr>
+              <a:lnSpc>
+                <a:spcPct val="120000"/>
+              </a:lnSpc>
+              <a:spcBef>
+                <a:spcPts val="1000"/>
+              </a:spcBef>
             </a:pPr>
             <a:r>
-              <a:rPr lang="en-US" sz="1600" dirty="0" smtClean="0">
-                <a:latin typeface="Courier New" panose="02070309020205020404" pitchFamily="49" charset="0"/>
-                <a:cs typeface="Courier New" panose="02070309020205020404" pitchFamily="49" charset="0"/>
-              </a:rPr>
-              <a:t>	a2_below </a:t>
-            </a:r>
-            <a:r>
-              <a:rPr lang="en-US" sz="1600" dirty="0">
-                <a:latin typeface="Courier New" panose="02070309020205020404" pitchFamily="49" charset="0"/>
-                <a:cs typeface="Courier New" panose="02070309020205020404" pitchFamily="49" charset="0"/>
-              </a:rPr>
-              <a:t>= (alt2 </a:t>
-            </a:r>
-            <a:r>
-              <a:rPr lang="en-US" sz="1600" b="1" dirty="0">
-                <a:latin typeface="Courier New" panose="02070309020205020404" pitchFamily="49" charset="0"/>
-                <a:cs typeface="Courier New" panose="02070309020205020404" pitchFamily="49" charset="0"/>
-              </a:rPr>
-              <a:t>&lt;</a:t>
-            </a:r>
-            <a:r>
-              <a:rPr lang="en-US" sz="1600" dirty="0">
-                <a:latin typeface="Courier New" panose="02070309020205020404" pitchFamily="49" charset="0"/>
-                <a:cs typeface="Courier New" panose="02070309020205020404" pitchFamily="49" charset="0"/>
-              </a:rPr>
-              <a:t> THRESHOLD); </a:t>
-            </a:r>
-            <a:r>
-              <a:rPr lang="en-US" sz="1600" dirty="0" smtClean="0">
-                <a:latin typeface="Courier New" panose="02070309020205020404" pitchFamily="49" charset="0"/>
-                <a:cs typeface="Courier New" panose="02070309020205020404" pitchFamily="49" charset="0"/>
-              </a:rPr>
-              <a:t>        // </a:t>
-            </a:r>
-            <a:r>
-              <a:rPr lang="en-US" sz="1600" dirty="0">
-                <a:latin typeface="Courier New" panose="02070309020205020404" pitchFamily="49" charset="0"/>
+              <a:rPr lang="en-US" sz="1600" b="1" dirty="0" smtClean="0">
+                <a:latin typeface="Consolas" panose="020B0609020204030204" pitchFamily="49" charset="0"/>
+                <a:cs typeface="Courier New" panose="02070309020205020404" pitchFamily="49" charset="0"/>
+              </a:rPr>
+              <a:t> </a:t>
+            </a:r>
+            <a:r>
+              <a:rPr lang="en-US" sz="1600" b="1" dirty="0" smtClean="0">
+                <a:latin typeface="Consolas" panose="020B0609020204030204" pitchFamily="49" charset="0"/>
                 <a:cs typeface="Courier New" panose="02070309020205020404" pitchFamily="49" charset="0"/>
               </a:rPr>
               <a:t>(2)</a:t>
             </a:r>
-          </a:p>
-          <a:p>
-            <a:pPr marL="0" indent="0">
-              <a:buNone/>
+            <a:endParaRPr lang="en-US" sz="1600" b="1" dirty="0" smtClean="0">
+              <a:latin typeface="Consolas" panose="020B0609020204030204" pitchFamily="49" charset="0"/>
+              <a:cs typeface="Courier New" panose="02070309020205020404" pitchFamily="49" charset="0"/>
+            </a:endParaRPr>
+          </a:p>
+          <a:p>
+            <a:pPr>
+              <a:lnSpc>
+                <a:spcPct val="120000"/>
+              </a:lnSpc>
+              <a:spcBef>
+                <a:spcPts val="1000"/>
+              </a:spcBef>
             </a:pPr>
             <a:r>
-              <a:rPr lang="en-US" sz="1600" dirty="0" smtClean="0">
-                <a:latin typeface="Courier New" panose="02070309020205020404" pitchFamily="49" charset="0"/>
-                <a:cs typeface="Courier New" panose="02070309020205020404" pitchFamily="49" charset="0"/>
-              </a:rPr>
-              <a:t>	a1_above </a:t>
-            </a:r>
-            <a:r>
-              <a:rPr lang="en-US" sz="1600" dirty="0">
-                <a:latin typeface="Courier New" panose="02070309020205020404" pitchFamily="49" charset="0"/>
-                <a:cs typeface="Courier New" panose="02070309020205020404" pitchFamily="49" charset="0"/>
-              </a:rPr>
-              <a:t>= (alt1 </a:t>
-            </a:r>
-            <a:r>
-              <a:rPr lang="en-US" sz="1600" b="1" dirty="0">
-                <a:latin typeface="Courier New" panose="02070309020205020404" pitchFamily="49" charset="0"/>
-                <a:cs typeface="Courier New" panose="02070309020205020404" pitchFamily="49" charset="0"/>
-              </a:rPr>
-              <a:t>&gt;=</a:t>
-            </a:r>
-            <a:r>
-              <a:rPr lang="en-US" sz="1600" dirty="0">
-                <a:latin typeface="Courier New" panose="02070309020205020404" pitchFamily="49" charset="0"/>
-                <a:cs typeface="Courier New" panose="02070309020205020404" pitchFamily="49" charset="0"/>
-              </a:rPr>
-              <a:t> T_HYST); </a:t>
-            </a:r>
-            <a:r>
-              <a:rPr lang="en-US" sz="1600" dirty="0" smtClean="0">
-                <a:latin typeface="Courier New" panose="02070309020205020404" pitchFamily="49" charset="0"/>
-                <a:cs typeface="Courier New" panose="02070309020205020404" pitchFamily="49" charset="0"/>
-              </a:rPr>
-              <a:t>          // </a:t>
-            </a:r>
-            <a:r>
-              <a:rPr lang="en-US" sz="1600" dirty="0">
-                <a:latin typeface="Courier New" panose="02070309020205020404" pitchFamily="49" charset="0"/>
+              <a:rPr lang="en-US" sz="1600" b="1" dirty="0" smtClean="0">
+                <a:latin typeface="Consolas" panose="020B0609020204030204" pitchFamily="49" charset="0"/>
+                <a:cs typeface="Courier New" panose="02070309020205020404" pitchFamily="49" charset="0"/>
+              </a:rPr>
+              <a:t> </a:t>
+            </a:r>
+            <a:r>
+              <a:rPr lang="en-US" sz="1600" b="1" dirty="0" smtClean="0">
+                <a:latin typeface="Consolas" panose="020B0609020204030204" pitchFamily="49" charset="0"/>
                 <a:cs typeface="Courier New" panose="02070309020205020404" pitchFamily="49" charset="0"/>
               </a:rPr>
               <a:t>(3)</a:t>
             </a:r>
-          </a:p>
-          <a:p>
-            <a:pPr marL="0" indent="0">
-              <a:buNone/>
+            <a:endParaRPr lang="en-US" sz="1600" b="1" dirty="0" smtClean="0">
+              <a:latin typeface="Consolas" panose="020B0609020204030204" pitchFamily="49" charset="0"/>
+              <a:cs typeface="Courier New" panose="02070309020205020404" pitchFamily="49" charset="0"/>
+            </a:endParaRPr>
+          </a:p>
+          <a:p>
+            <a:pPr>
+              <a:lnSpc>
+                <a:spcPct val="120000"/>
+              </a:lnSpc>
+              <a:spcBef>
+                <a:spcPts val="1000"/>
+              </a:spcBef>
             </a:pPr>
             <a:r>
-              <a:rPr lang="en-US" sz="1600" dirty="0" smtClean="0">
-                <a:latin typeface="Courier New" panose="02070309020205020404" pitchFamily="49" charset="0"/>
-                <a:cs typeface="Courier New" panose="02070309020205020404" pitchFamily="49" charset="0"/>
-              </a:rPr>
-              <a:t>	a2_above </a:t>
-            </a:r>
-            <a:r>
-              <a:rPr lang="en-US" sz="1600" dirty="0">
-                <a:latin typeface="Courier New" panose="02070309020205020404" pitchFamily="49" charset="0"/>
-                <a:cs typeface="Courier New" panose="02070309020205020404" pitchFamily="49" charset="0"/>
-              </a:rPr>
-              <a:t>= (alt2 </a:t>
-            </a:r>
-            <a:r>
-              <a:rPr lang="en-US" sz="1600" b="1" dirty="0">
-                <a:latin typeface="Courier New" panose="02070309020205020404" pitchFamily="49" charset="0"/>
-                <a:cs typeface="Courier New" panose="02070309020205020404" pitchFamily="49" charset="0"/>
-              </a:rPr>
-              <a:t>&gt;=</a:t>
-            </a:r>
-            <a:r>
-              <a:rPr lang="en-US" sz="1600" dirty="0">
-                <a:latin typeface="Courier New" panose="02070309020205020404" pitchFamily="49" charset="0"/>
-                <a:cs typeface="Courier New" panose="02070309020205020404" pitchFamily="49" charset="0"/>
-              </a:rPr>
-              <a:t> T_HYST); </a:t>
-            </a:r>
-            <a:r>
-              <a:rPr lang="en-US" sz="1600" dirty="0" smtClean="0">
-                <a:latin typeface="Courier New" panose="02070309020205020404" pitchFamily="49" charset="0"/>
-                <a:cs typeface="Courier New" panose="02070309020205020404" pitchFamily="49" charset="0"/>
-              </a:rPr>
-              <a:t>          // </a:t>
-            </a:r>
-            <a:r>
-              <a:rPr lang="en-US" sz="1600" dirty="0">
-                <a:latin typeface="Courier New" panose="02070309020205020404" pitchFamily="49" charset="0"/>
+              <a:rPr lang="en-US" sz="1600" b="1" dirty="0" smtClean="0">
+                <a:latin typeface="Consolas" panose="020B0609020204030204" pitchFamily="49" charset="0"/>
+                <a:cs typeface="Courier New" panose="02070309020205020404" pitchFamily="49" charset="0"/>
+              </a:rPr>
+              <a:t> </a:t>
+            </a:r>
+            <a:r>
+              <a:rPr lang="en-US" sz="1600" b="1" dirty="0" smtClean="0">
+                <a:latin typeface="Consolas" panose="020B0609020204030204" pitchFamily="49" charset="0"/>
                 <a:cs typeface="Courier New" panose="02070309020205020404" pitchFamily="49" charset="0"/>
               </a:rPr>
               <a:t>(4)</a:t>
             </a:r>
-          </a:p>
-          <a:p>
-            <a:pPr marL="0" indent="0">
-              <a:buNone/>
+            <a:endParaRPr lang="en-US" sz="1600" b="1" dirty="0" smtClean="0">
+              <a:latin typeface="Consolas" panose="020B0609020204030204" pitchFamily="49" charset="0"/>
+              <a:cs typeface="Courier New" panose="02070309020205020404" pitchFamily="49" charset="0"/>
+            </a:endParaRPr>
+          </a:p>
+          <a:p>
+            <a:pPr>
+              <a:lnSpc>
+                <a:spcPct val="120000"/>
+              </a:lnSpc>
+              <a:spcBef>
+                <a:spcPts val="1000"/>
+              </a:spcBef>
             </a:pPr>
             <a:r>
-              <a:rPr lang="en-US" sz="1600" dirty="0" smtClean="0">
-                <a:latin typeface="Courier New" panose="02070309020205020404" pitchFamily="49" charset="0"/>
-                <a:cs typeface="Courier New" panose="02070309020205020404" pitchFamily="49" charset="0"/>
-              </a:rPr>
-              <a:t>	below </a:t>
-            </a:r>
-            <a:r>
-              <a:rPr lang="en-US" sz="1600" dirty="0">
-                <a:latin typeface="Courier New" panose="02070309020205020404" pitchFamily="49" charset="0"/>
-                <a:cs typeface="Courier New" panose="02070309020205020404" pitchFamily="49" charset="0"/>
-              </a:rPr>
-              <a:t>= a1_below</a:t>
-            </a:r>
-            <a:r>
-              <a:rPr lang="en-US" sz="1600" b="1" dirty="0">
-                <a:latin typeface="Courier New" panose="02070309020205020404" pitchFamily="49" charset="0"/>
-                <a:cs typeface="Courier New" panose="02070309020205020404" pitchFamily="49" charset="0"/>
-              </a:rPr>
-              <a:t> or </a:t>
-            </a:r>
-            <a:r>
-              <a:rPr lang="en-US" sz="1600" dirty="0">
-                <a:latin typeface="Courier New" panose="02070309020205020404" pitchFamily="49" charset="0"/>
-                <a:cs typeface="Courier New" panose="02070309020205020404" pitchFamily="49" charset="0"/>
-              </a:rPr>
-              <a:t>a2_below; </a:t>
-            </a:r>
-            <a:r>
-              <a:rPr lang="en-US" sz="1600" dirty="0" smtClean="0">
-                <a:latin typeface="Courier New" panose="02070309020205020404" pitchFamily="49" charset="0"/>
-                <a:cs typeface="Courier New" panose="02070309020205020404" pitchFamily="49" charset="0"/>
-              </a:rPr>
-              <a:t>         // </a:t>
-            </a:r>
-            <a:r>
-              <a:rPr lang="en-US" sz="1600" dirty="0">
-                <a:latin typeface="Courier New" panose="02070309020205020404" pitchFamily="49" charset="0"/>
+              <a:rPr lang="en-US" sz="1600" b="1" dirty="0" smtClean="0">
+                <a:latin typeface="Consolas" panose="020B0609020204030204" pitchFamily="49" charset="0"/>
+                <a:cs typeface="Courier New" panose="02070309020205020404" pitchFamily="49" charset="0"/>
+              </a:rPr>
+              <a:t> </a:t>
+            </a:r>
+            <a:r>
+              <a:rPr lang="en-US" sz="1600" b="1" dirty="0" smtClean="0">
+                <a:latin typeface="Consolas" panose="020B0609020204030204" pitchFamily="49" charset="0"/>
                 <a:cs typeface="Courier New" panose="02070309020205020404" pitchFamily="49" charset="0"/>
               </a:rPr>
               <a:t>(5)</a:t>
             </a:r>
-          </a:p>
-          <a:p>
-            <a:pPr marL="0" indent="0">
-              <a:buNone/>
+            <a:endParaRPr lang="en-US" sz="1600" b="1" dirty="0" smtClean="0">
+              <a:latin typeface="Consolas" panose="020B0609020204030204" pitchFamily="49" charset="0"/>
+              <a:cs typeface="Courier New" panose="02070309020205020404" pitchFamily="49" charset="0"/>
+            </a:endParaRPr>
+          </a:p>
+          <a:p>
+            <a:pPr>
+              <a:lnSpc>
+                <a:spcPct val="120000"/>
+              </a:lnSpc>
+              <a:spcBef>
+                <a:spcPts val="1000"/>
+              </a:spcBef>
             </a:pPr>
             <a:r>
-              <a:rPr lang="en-US" sz="1600" dirty="0" smtClean="0">
-                <a:latin typeface="Courier New" panose="02070309020205020404" pitchFamily="49" charset="0"/>
-                <a:cs typeface="Courier New" panose="02070309020205020404" pitchFamily="49" charset="0"/>
-              </a:rPr>
-              <a:t>	</a:t>
-            </a:r>
-            <a:r>
-              <a:rPr lang="en-US" sz="1600" dirty="0" err="1" smtClean="0">
-                <a:latin typeface="Courier New" panose="02070309020205020404" pitchFamily="49" charset="0"/>
-                <a:cs typeface="Courier New" panose="02070309020205020404" pitchFamily="49" charset="0"/>
-              </a:rPr>
-              <a:t>above_hyst</a:t>
-            </a:r>
-            <a:r>
-              <a:rPr lang="en-US" sz="1600" dirty="0" smtClean="0">
-                <a:latin typeface="Courier New" panose="02070309020205020404" pitchFamily="49" charset="0"/>
+              <a:rPr lang="en-US" sz="1600" b="1" dirty="0" smtClean="0">
+                <a:latin typeface="Consolas" panose="020B0609020204030204" pitchFamily="49" charset="0"/>
                 <a:cs typeface="Courier New" panose="02070309020205020404" pitchFamily="49" charset="0"/>
               </a:rPr>
               <a:t> </a:t>
             </a:r>
             <a:r>
-              <a:rPr lang="en-US" sz="1600" dirty="0">
-                <a:latin typeface="Courier New" panose="02070309020205020404" pitchFamily="49" charset="0"/>
-                <a:cs typeface="Courier New" panose="02070309020205020404" pitchFamily="49" charset="0"/>
-              </a:rPr>
-              <a:t>= a1_above </a:t>
-            </a:r>
-            <a:r>
-              <a:rPr lang="en-US" sz="1600" b="1" dirty="0">
-                <a:latin typeface="Courier New" panose="02070309020205020404" pitchFamily="49" charset="0"/>
-                <a:cs typeface="Courier New" panose="02070309020205020404" pitchFamily="49" charset="0"/>
-              </a:rPr>
-              <a:t>and</a:t>
-            </a:r>
-            <a:r>
-              <a:rPr lang="en-US" sz="1600" dirty="0">
-                <a:latin typeface="Courier New" panose="02070309020205020404" pitchFamily="49" charset="0"/>
-                <a:cs typeface="Courier New" panose="02070309020205020404" pitchFamily="49" charset="0"/>
-              </a:rPr>
-              <a:t> a2_above; </a:t>
-            </a:r>
-            <a:r>
-              <a:rPr lang="en-US" sz="1600" dirty="0" smtClean="0">
-                <a:latin typeface="Courier New" panose="02070309020205020404" pitchFamily="49" charset="0"/>
-                <a:cs typeface="Courier New" panose="02070309020205020404" pitchFamily="49" charset="0"/>
-              </a:rPr>
-              <a:t>   // </a:t>
-            </a:r>
-            <a:r>
-              <a:rPr lang="en-US" sz="1600" dirty="0">
-                <a:latin typeface="Courier New" panose="02070309020205020404" pitchFamily="49" charset="0"/>
+              <a:rPr lang="en-US" sz="1600" b="1" dirty="0" smtClean="0">
+                <a:latin typeface="Consolas" panose="020B0609020204030204" pitchFamily="49" charset="0"/>
                 <a:cs typeface="Courier New" panose="02070309020205020404" pitchFamily="49" charset="0"/>
               </a:rPr>
               <a:t>(6)</a:t>
             </a:r>
-          </a:p>
-          <a:p>
-            <a:pPr marL="0" indent="0">
-              <a:buNone/>
+            <a:endParaRPr lang="en-US" sz="1600" b="1" dirty="0" smtClean="0">
+              <a:latin typeface="Consolas" panose="020B0609020204030204" pitchFamily="49" charset="0"/>
+              <a:cs typeface="Courier New" panose="02070309020205020404" pitchFamily="49" charset="0"/>
+            </a:endParaRPr>
+          </a:p>
+          <a:p>
+            <a:pPr>
+              <a:lnSpc>
+                <a:spcPct val="120000"/>
+              </a:lnSpc>
+              <a:spcBef>
+                <a:spcPts val="1000"/>
+              </a:spcBef>
             </a:pPr>
             <a:r>
-              <a:rPr lang="en-US" sz="1600" dirty="0" smtClean="0">
-                <a:latin typeface="Courier New" panose="02070309020205020404" pitchFamily="49" charset="0"/>
-                <a:cs typeface="Courier New" panose="02070309020205020404" pitchFamily="49" charset="0"/>
-              </a:rPr>
-              <a:t>	</a:t>
-            </a:r>
-            <a:r>
-              <a:rPr lang="en-US" sz="1600" dirty="0" err="1" smtClean="0">
-                <a:latin typeface="Courier New" panose="02070309020205020404" pitchFamily="49" charset="0"/>
-                <a:cs typeface="Courier New" panose="02070309020205020404" pitchFamily="49" charset="0"/>
-              </a:rPr>
-              <a:t>doi_on</a:t>
-            </a:r>
-            <a:r>
-              <a:rPr lang="en-US" sz="1600" dirty="0" smtClean="0">
-                <a:latin typeface="Courier New" panose="02070309020205020404" pitchFamily="49" charset="0"/>
+              <a:rPr lang="en-US" sz="1600" b="1" dirty="0" smtClean="0">
+                <a:latin typeface="Consolas" panose="020B0609020204030204" pitchFamily="49" charset="0"/>
                 <a:cs typeface="Courier New" panose="02070309020205020404" pitchFamily="49" charset="0"/>
               </a:rPr>
               <a:t> </a:t>
             </a:r>
             <a:r>
-              <a:rPr lang="en-US" sz="1600" dirty="0">
-                <a:latin typeface="Courier New" panose="02070309020205020404" pitchFamily="49" charset="0"/>
-                <a:cs typeface="Courier New" panose="02070309020205020404" pitchFamily="49" charset="0"/>
-              </a:rPr>
-              <a:t>= </a:t>
-            </a:r>
-            <a:r>
-              <a:rPr lang="en-US" sz="1600" b="1" dirty="0">
-                <a:latin typeface="Courier New" panose="02070309020205020404" pitchFamily="49" charset="0"/>
-                <a:cs typeface="Courier New" panose="02070309020205020404" pitchFamily="49" charset="0"/>
-              </a:rPr>
-              <a:t>if</a:t>
-            </a:r>
-            <a:r>
-              <a:rPr lang="en-US" sz="1600" dirty="0">
-                <a:latin typeface="Courier New" panose="02070309020205020404" pitchFamily="49" charset="0"/>
-                <a:cs typeface="Courier New" panose="02070309020205020404" pitchFamily="49" charset="0"/>
-              </a:rPr>
-              <a:t> (below </a:t>
-            </a:r>
-            <a:r>
-              <a:rPr lang="en-US" sz="1600" b="1" dirty="0">
-                <a:latin typeface="Courier New" panose="02070309020205020404" pitchFamily="49" charset="0"/>
-                <a:cs typeface="Courier New" panose="02070309020205020404" pitchFamily="49" charset="0"/>
-              </a:rPr>
-              <a:t>and</a:t>
-            </a:r>
-            <a:r>
-              <a:rPr lang="en-US" sz="1600" dirty="0">
-                <a:latin typeface="Courier New" panose="02070309020205020404" pitchFamily="49" charset="0"/>
+              <a:rPr lang="en-US" sz="1600" b="1" dirty="0" smtClean="0">
+                <a:latin typeface="Consolas" panose="020B0609020204030204" pitchFamily="49" charset="0"/>
+                <a:cs typeface="Courier New" panose="02070309020205020404" pitchFamily="49" charset="0"/>
+              </a:rPr>
+              <a:t>(7)</a:t>
+            </a:r>
+            <a:r>
+              <a:rPr lang="en-US" sz="1600" b="1" dirty="0" smtClean="0">
+                <a:latin typeface="Consolas" panose="020B0609020204030204" pitchFamily="49" charset="0"/>
+                <a:cs typeface="Courier New" panose="02070309020205020404" pitchFamily="49" charset="0"/>
+              </a:rPr>
+              <a:t/>
+            </a:r>
+            <a:br>
+              <a:rPr lang="en-US" sz="1600" b="1" dirty="0" smtClean="0">
+                <a:latin typeface="Consolas" panose="020B0609020204030204" pitchFamily="49" charset="0"/>
+                <a:cs typeface="Courier New" panose="02070309020205020404" pitchFamily="49" charset="0"/>
+              </a:rPr>
+            </a:br>
+            <a:endParaRPr lang="en-US" sz="1600" b="1" dirty="0" smtClean="0">
+              <a:latin typeface="Consolas" panose="020B0609020204030204" pitchFamily="49" charset="0"/>
+              <a:cs typeface="Courier New" panose="02070309020205020404" pitchFamily="49" charset="0"/>
+            </a:endParaRPr>
+          </a:p>
+          <a:p>
+            <a:pPr>
+              <a:lnSpc>
+                <a:spcPct val="120000"/>
+              </a:lnSpc>
+              <a:spcBef>
+                <a:spcPts val="1000"/>
+              </a:spcBef>
+            </a:pPr>
+            <a:r>
+              <a:rPr lang="en-US" sz="1600" b="1" dirty="0" smtClean="0">
+                <a:latin typeface="Consolas" panose="020B0609020204030204" pitchFamily="49" charset="0"/>
                 <a:cs typeface="Courier New" panose="02070309020205020404" pitchFamily="49" charset="0"/>
               </a:rPr>
               <a:t> </a:t>
             </a:r>
             <a:r>
-              <a:rPr lang="en-US" sz="1600" b="1" dirty="0">
-                <a:latin typeface="Courier New" panose="02070309020205020404" pitchFamily="49" charset="0"/>
-                <a:cs typeface="Courier New" panose="02070309020205020404" pitchFamily="49" charset="0"/>
-              </a:rPr>
-              <a:t>not</a:t>
-            </a:r>
-            <a:r>
-              <a:rPr lang="en-US" sz="1600" dirty="0">
-                <a:latin typeface="Courier New" panose="02070309020205020404" pitchFamily="49" charset="0"/>
-                <a:cs typeface="Courier New" panose="02070309020205020404" pitchFamily="49" charset="0"/>
-              </a:rPr>
-              <a:t> inhibit) </a:t>
-            </a:r>
-            <a:r>
-              <a:rPr lang="en-US" sz="1600" dirty="0" smtClean="0">
-                <a:latin typeface="Courier New" panose="02070309020205020404" pitchFamily="49" charset="0"/>
-                <a:cs typeface="Courier New" panose="02070309020205020404" pitchFamily="49" charset="0"/>
-              </a:rPr>
-              <a:t>   // </a:t>
-            </a:r>
-            <a:r>
-              <a:rPr lang="en-US" sz="1600" dirty="0">
-                <a:latin typeface="Courier New" panose="02070309020205020404" pitchFamily="49" charset="0"/>
-                <a:cs typeface="Courier New" panose="02070309020205020404" pitchFamily="49" charset="0"/>
-              </a:rPr>
-              <a:t>(7)</a:t>
-            </a:r>
-          </a:p>
-          <a:p>
-            <a:pPr marL="0" indent="0">
-              <a:buNone/>
+              <a:rPr lang="en-US" sz="1600" b="1" dirty="0" smtClean="0">
+                <a:latin typeface="Consolas" panose="020B0609020204030204" pitchFamily="49" charset="0"/>
+                <a:cs typeface="Courier New" panose="02070309020205020404" pitchFamily="49" charset="0"/>
+              </a:rPr>
+              <a:t>(8)</a:t>
+            </a:r>
+            <a:r>
+              <a:rPr lang="en-US" sz="1600" b="1" dirty="0" smtClean="0">
+                <a:latin typeface="Consolas" panose="020B0609020204030204" pitchFamily="49" charset="0"/>
+                <a:cs typeface="Courier New" panose="02070309020205020404" pitchFamily="49" charset="0"/>
+              </a:rPr>
+              <a:t/>
+            </a:r>
+            <a:br>
+              <a:rPr lang="en-US" sz="1600" b="1" dirty="0" smtClean="0">
+                <a:latin typeface="Consolas" panose="020B0609020204030204" pitchFamily="49" charset="0"/>
+                <a:cs typeface="Courier New" panose="02070309020205020404" pitchFamily="49" charset="0"/>
+              </a:rPr>
+            </a:br>
+            <a:endParaRPr lang="en-US" sz="1600" b="1" dirty="0" smtClean="0">
+              <a:latin typeface="Consolas" panose="020B0609020204030204" pitchFamily="49" charset="0"/>
+              <a:cs typeface="Courier New" panose="02070309020205020404" pitchFamily="49" charset="0"/>
+            </a:endParaRPr>
+          </a:p>
+          <a:p>
+            <a:pPr>
+              <a:lnSpc>
+                <a:spcPct val="120000"/>
+              </a:lnSpc>
+              <a:spcBef>
+                <a:spcPts val="1000"/>
+              </a:spcBef>
             </a:pPr>
             <a:r>
-              <a:rPr lang="en-US" sz="1600" dirty="0" smtClean="0">
-                <a:latin typeface="Courier New" panose="02070309020205020404" pitchFamily="49" charset="0"/>
-                <a:cs typeface="Courier New" panose="02070309020205020404" pitchFamily="49" charset="0"/>
-              </a:rPr>
-              <a:t>		 </a:t>
-            </a:r>
-            <a:r>
-              <a:rPr lang="en-US" sz="1600" dirty="0" smtClean="0">
-                <a:latin typeface="Courier New" panose="02070309020205020404" pitchFamily="49" charset="0"/>
+              <a:rPr lang="en-US" sz="1600" b="1" dirty="0" smtClean="0">
+                <a:latin typeface="Consolas" panose="020B0609020204030204" pitchFamily="49" charset="0"/>
                 <a:cs typeface="Courier New" panose="02070309020205020404" pitchFamily="49" charset="0"/>
               </a:rPr>
               <a:t> </a:t>
             </a:r>
             <a:r>
               <a:rPr lang="en-US" sz="1600" b="1" dirty="0" smtClean="0">
-                <a:latin typeface="Courier New" panose="02070309020205020404" pitchFamily="49" charset="0"/>
-                <a:cs typeface="Courier New" panose="02070309020205020404" pitchFamily="49" charset="0"/>
-              </a:rPr>
-              <a:t>t</a:t>
-            </a:r>
-            <a:r>
-              <a:rPr lang="en-US" sz="1600" b="1" dirty="0" smtClean="0">
-                <a:latin typeface="Courier New" panose="02070309020205020404" pitchFamily="49" charset="0"/>
-                <a:cs typeface="Courier New" panose="02070309020205020404" pitchFamily="49" charset="0"/>
-              </a:rPr>
-              <a:t>hen</a:t>
-            </a:r>
-            <a:r>
-              <a:rPr lang="en-US" sz="1600" dirty="0" smtClean="0">
-                <a:latin typeface="Courier New" panose="02070309020205020404" pitchFamily="49" charset="0"/>
-                <a:cs typeface="Courier New" panose="02070309020205020404" pitchFamily="49" charset="0"/>
-              </a:rPr>
-              <a:t> </a:t>
-            </a:r>
-            <a:r>
-              <a:rPr lang="en-US" sz="1600" i="1" dirty="0">
-                <a:latin typeface="Courier New" panose="02070309020205020404" pitchFamily="49" charset="0"/>
-                <a:cs typeface="Courier New" panose="02070309020205020404" pitchFamily="49" charset="0"/>
-              </a:rPr>
-              <a:t>true</a:t>
-            </a:r>
-            <a:r>
-              <a:rPr lang="en-US" sz="1600" dirty="0">
-                <a:latin typeface="Courier New" panose="02070309020205020404" pitchFamily="49" charset="0"/>
-                <a:cs typeface="Courier New" panose="02070309020205020404" pitchFamily="49" charset="0"/>
-              </a:rPr>
-              <a:t> </a:t>
-            </a:r>
-            <a:r>
-              <a:rPr lang="en-US" sz="1600" b="1" dirty="0">
-                <a:latin typeface="Courier New" panose="02070309020205020404" pitchFamily="49" charset="0"/>
-                <a:cs typeface="Courier New" panose="02070309020205020404" pitchFamily="49" charset="0"/>
-              </a:rPr>
-              <a:t>else</a:t>
-            </a:r>
-            <a:r>
-              <a:rPr lang="en-US" sz="1600" dirty="0">
-                <a:latin typeface="Courier New" panose="02070309020205020404" pitchFamily="49" charset="0"/>
-                <a:cs typeface="Courier New" panose="02070309020205020404" pitchFamily="49" charset="0"/>
-              </a:rPr>
-              <a:t> d1;</a:t>
-            </a:r>
-          </a:p>
-          <a:p>
-            <a:pPr marL="0" indent="0">
-              <a:buNone/>
-            </a:pPr>
-            <a:r>
-              <a:rPr lang="en-US" sz="1600" dirty="0" smtClean="0">
-                <a:latin typeface="Courier New" panose="02070309020205020404" pitchFamily="49" charset="0"/>
-                <a:cs typeface="Courier New" panose="02070309020205020404" pitchFamily="49" charset="0"/>
-              </a:rPr>
-              <a:t>	d1 </a:t>
-            </a:r>
-            <a:r>
-              <a:rPr lang="en-US" sz="1600" dirty="0">
-                <a:latin typeface="Courier New" panose="02070309020205020404" pitchFamily="49" charset="0"/>
-                <a:cs typeface="Courier New" panose="02070309020205020404" pitchFamily="49" charset="0"/>
-              </a:rPr>
-              <a:t>= </a:t>
-            </a:r>
-            <a:r>
-              <a:rPr lang="en-US" sz="1600" b="1" dirty="0">
-                <a:latin typeface="Courier New" panose="02070309020205020404" pitchFamily="49" charset="0"/>
-                <a:cs typeface="Courier New" panose="02070309020205020404" pitchFamily="49" charset="0"/>
-              </a:rPr>
-              <a:t>if</a:t>
-            </a:r>
-            <a:r>
-              <a:rPr lang="en-US" sz="1600" dirty="0">
-                <a:latin typeface="Courier New" panose="02070309020205020404" pitchFamily="49" charset="0"/>
-                <a:cs typeface="Courier New" panose="02070309020205020404" pitchFamily="49" charset="0"/>
-              </a:rPr>
-              <a:t> (inhibit </a:t>
-            </a:r>
-            <a:r>
-              <a:rPr lang="en-US" sz="1600" b="1" dirty="0">
-                <a:latin typeface="Courier New" panose="02070309020205020404" pitchFamily="49" charset="0"/>
-                <a:cs typeface="Courier New" panose="02070309020205020404" pitchFamily="49" charset="0"/>
-              </a:rPr>
-              <a:t>or</a:t>
-            </a:r>
-            <a:r>
-              <a:rPr lang="en-US" sz="1600" dirty="0">
-                <a:latin typeface="Courier New" panose="02070309020205020404" pitchFamily="49" charset="0"/>
-                <a:cs typeface="Courier New" panose="02070309020205020404" pitchFamily="49" charset="0"/>
-              </a:rPr>
-              <a:t> </a:t>
-            </a:r>
-            <a:r>
-              <a:rPr lang="en-US" sz="1600" dirty="0" err="1">
-                <a:latin typeface="Courier New" panose="02070309020205020404" pitchFamily="49" charset="0"/>
-                <a:cs typeface="Courier New" panose="02070309020205020404" pitchFamily="49" charset="0"/>
-              </a:rPr>
-              <a:t>above_hyst</a:t>
-            </a:r>
-            <a:r>
-              <a:rPr lang="en-US" sz="1600" dirty="0">
-                <a:latin typeface="Courier New" panose="02070309020205020404" pitchFamily="49" charset="0"/>
-                <a:cs typeface="Courier New" panose="02070309020205020404" pitchFamily="49" charset="0"/>
-              </a:rPr>
-              <a:t>) </a:t>
-            </a:r>
-            <a:r>
-              <a:rPr lang="en-US" sz="1600" dirty="0" smtClean="0">
-                <a:latin typeface="Courier New" panose="02070309020205020404" pitchFamily="49" charset="0"/>
-                <a:cs typeface="Courier New" panose="02070309020205020404" pitchFamily="49" charset="0"/>
-              </a:rPr>
-              <a:t>       // </a:t>
-            </a:r>
-            <a:r>
-              <a:rPr lang="en-US" sz="1600" dirty="0">
-                <a:latin typeface="Courier New" panose="02070309020205020404" pitchFamily="49" charset="0"/>
-                <a:cs typeface="Courier New" panose="02070309020205020404" pitchFamily="49" charset="0"/>
-              </a:rPr>
-              <a:t>(8)</a:t>
-            </a:r>
-          </a:p>
-          <a:p>
-            <a:pPr marL="0" indent="0">
-              <a:buNone/>
-            </a:pPr>
-            <a:r>
-              <a:rPr lang="en-US" sz="1600" dirty="0" smtClean="0">
-                <a:latin typeface="Courier New" panose="02070309020205020404" pitchFamily="49" charset="0"/>
-                <a:cs typeface="Courier New" panose="02070309020205020404" pitchFamily="49" charset="0"/>
-              </a:rPr>
-              <a:t>	     </a:t>
-            </a:r>
-            <a:r>
-              <a:rPr lang="en-US" sz="1600" b="1" dirty="0" smtClean="0">
-                <a:latin typeface="Courier New" panose="02070309020205020404" pitchFamily="49" charset="0"/>
-                <a:cs typeface="Courier New" panose="02070309020205020404" pitchFamily="49" charset="0"/>
-              </a:rPr>
-              <a:t>then</a:t>
-            </a:r>
-            <a:r>
-              <a:rPr lang="en-US" sz="1600" dirty="0" smtClean="0">
-                <a:latin typeface="Courier New" panose="02070309020205020404" pitchFamily="49" charset="0"/>
-                <a:cs typeface="Courier New" panose="02070309020205020404" pitchFamily="49" charset="0"/>
-              </a:rPr>
-              <a:t> </a:t>
-            </a:r>
-            <a:r>
-              <a:rPr lang="en-US" sz="1600" i="1" dirty="0">
-                <a:latin typeface="Courier New" panose="02070309020205020404" pitchFamily="49" charset="0"/>
-                <a:cs typeface="Courier New" panose="02070309020205020404" pitchFamily="49" charset="0"/>
-              </a:rPr>
-              <a:t>false</a:t>
-            </a:r>
-            <a:r>
-              <a:rPr lang="en-US" sz="1600" dirty="0">
-                <a:latin typeface="Courier New" panose="02070309020205020404" pitchFamily="49" charset="0"/>
-                <a:cs typeface="Courier New" panose="02070309020205020404" pitchFamily="49" charset="0"/>
-              </a:rPr>
-              <a:t> </a:t>
-            </a:r>
-            <a:r>
-              <a:rPr lang="en-US" sz="1600" b="1" dirty="0">
-                <a:latin typeface="Courier New" panose="02070309020205020404" pitchFamily="49" charset="0"/>
-                <a:cs typeface="Courier New" panose="02070309020205020404" pitchFamily="49" charset="0"/>
-              </a:rPr>
-              <a:t>else</a:t>
-            </a:r>
-            <a:r>
-              <a:rPr lang="en-US" sz="1600" dirty="0">
-                <a:latin typeface="Courier New" panose="02070309020205020404" pitchFamily="49" charset="0"/>
-                <a:cs typeface="Courier New" panose="02070309020205020404" pitchFamily="49" charset="0"/>
-              </a:rPr>
-              <a:t> d2;</a:t>
-            </a:r>
-          </a:p>
-          <a:p>
-            <a:pPr marL="0" indent="0">
-              <a:buNone/>
-            </a:pPr>
-            <a:r>
-              <a:rPr lang="en-US" sz="1600" dirty="0" smtClean="0">
-                <a:latin typeface="Courier New" panose="02070309020205020404" pitchFamily="49" charset="0"/>
-                <a:cs typeface="Courier New" panose="02070309020205020404" pitchFamily="49" charset="0"/>
-              </a:rPr>
-              <a:t>	d2 </a:t>
-            </a:r>
-            <a:r>
-              <a:rPr lang="en-US" sz="1600" dirty="0">
-                <a:latin typeface="Courier New" panose="02070309020205020404" pitchFamily="49" charset="0"/>
-                <a:cs typeface="Courier New" panose="02070309020205020404" pitchFamily="49" charset="0"/>
-              </a:rPr>
-              <a:t>= (</a:t>
-            </a:r>
-            <a:r>
-              <a:rPr lang="en-US" sz="1600" i="1" dirty="0">
-                <a:latin typeface="Courier New" panose="02070309020205020404" pitchFamily="49" charset="0"/>
-                <a:cs typeface="Courier New" panose="02070309020205020404" pitchFamily="49" charset="0"/>
-              </a:rPr>
-              <a:t>false</a:t>
-            </a:r>
-            <a:r>
-              <a:rPr lang="en-US" sz="1600" dirty="0">
-                <a:latin typeface="Courier New" panose="02070309020205020404" pitchFamily="49" charset="0"/>
-                <a:cs typeface="Courier New" panose="02070309020205020404" pitchFamily="49" charset="0"/>
-              </a:rPr>
-              <a:t> </a:t>
-            </a:r>
-            <a:r>
-              <a:rPr lang="en-US" sz="1600" b="1" dirty="0">
-                <a:latin typeface="Courier New" panose="02070309020205020404" pitchFamily="49" charset="0"/>
-                <a:cs typeface="Courier New" panose="02070309020205020404" pitchFamily="49" charset="0"/>
-              </a:rPr>
-              <a:t>-&gt;</a:t>
-            </a:r>
-            <a:r>
-              <a:rPr lang="en-US" sz="1600" dirty="0">
-                <a:latin typeface="Courier New" panose="02070309020205020404" pitchFamily="49" charset="0"/>
-                <a:cs typeface="Courier New" panose="02070309020205020404" pitchFamily="49" charset="0"/>
-              </a:rPr>
-              <a:t> </a:t>
-            </a:r>
-            <a:r>
-              <a:rPr lang="en-US" sz="1600" i="1" dirty="0">
-                <a:latin typeface="Courier New" panose="02070309020205020404" pitchFamily="49" charset="0"/>
-                <a:cs typeface="Courier New" panose="02070309020205020404" pitchFamily="49" charset="0"/>
-              </a:rPr>
-              <a:t>pre</a:t>
-            </a:r>
-            <a:r>
-              <a:rPr lang="en-US" sz="1600" dirty="0">
-                <a:latin typeface="Courier New" panose="02070309020205020404" pitchFamily="49" charset="0"/>
-                <a:cs typeface="Courier New" panose="02070309020205020404" pitchFamily="49" charset="0"/>
-              </a:rPr>
-              <a:t>(</a:t>
-            </a:r>
-            <a:r>
-              <a:rPr lang="en-US" sz="1600" dirty="0" err="1">
-                <a:latin typeface="Courier New" panose="02070309020205020404" pitchFamily="49" charset="0"/>
-                <a:cs typeface="Courier New" panose="02070309020205020404" pitchFamily="49" charset="0"/>
-              </a:rPr>
-              <a:t>doi_on</a:t>
-            </a:r>
-            <a:r>
-              <a:rPr lang="en-US" sz="1600" dirty="0">
-                <a:latin typeface="Courier New" panose="02070309020205020404" pitchFamily="49" charset="0"/>
-                <a:cs typeface="Courier New" panose="02070309020205020404" pitchFamily="49" charset="0"/>
-              </a:rPr>
-              <a:t>)); </a:t>
-            </a:r>
-            <a:r>
-              <a:rPr lang="en-US" sz="1600" dirty="0" smtClean="0">
-                <a:latin typeface="Courier New" panose="02070309020205020404" pitchFamily="49" charset="0"/>
-                <a:cs typeface="Courier New" panose="02070309020205020404" pitchFamily="49" charset="0"/>
-              </a:rPr>
-              <a:t>          // </a:t>
-            </a:r>
-            <a:r>
-              <a:rPr lang="en-US" sz="1600" dirty="0">
-                <a:latin typeface="Courier New" panose="02070309020205020404" pitchFamily="49" charset="0"/>
+                <a:latin typeface="Consolas" panose="020B0609020204030204" pitchFamily="49" charset="0"/>
                 <a:cs typeface="Courier New" panose="02070309020205020404" pitchFamily="49" charset="0"/>
               </a:rPr>
               <a:t>(9)</a:t>
             </a:r>
-          </a:p>
-          <a:p>
-            <a:pPr marL="0" indent="0">
-              <a:buNone/>
-            </a:pPr>
-            <a:r>
-              <a:rPr lang="en-US" sz="1600" dirty="0">
-                <a:latin typeface="Courier New" panose="02070309020205020404" pitchFamily="49" charset="0"/>
-                <a:cs typeface="Courier New" panose="02070309020205020404" pitchFamily="49" charset="0"/>
-              </a:rPr>
-              <a:t> </a:t>
-            </a:r>
-            <a:r>
-              <a:rPr lang="en-US" sz="1600" dirty="0" smtClean="0">
-                <a:latin typeface="Courier New" panose="02070309020205020404" pitchFamily="49" charset="0"/>
-                <a:cs typeface="Courier New" panose="02070309020205020404" pitchFamily="49" charset="0"/>
-              </a:rPr>
-              <a:t>    </a:t>
-            </a:r>
-            <a:r>
-              <a:rPr lang="en-US" sz="1600" b="1" dirty="0" err="1" smtClean="0">
-                <a:latin typeface="Courier New" panose="02070309020205020404" pitchFamily="49" charset="0"/>
-                <a:cs typeface="Courier New" panose="02070309020205020404" pitchFamily="49" charset="0"/>
-              </a:rPr>
-              <a:t>tel</a:t>
-            </a:r>
-            <a:r>
-              <a:rPr lang="en-US" sz="1600" dirty="0">
-                <a:latin typeface="Courier New" panose="02070309020205020404" pitchFamily="49" charset="0"/>
-                <a:cs typeface="Courier New" panose="02070309020205020404" pitchFamily="49" charset="0"/>
-              </a:rPr>
-              <a:t>;</a:t>
-            </a:r>
+            <a:endParaRPr lang="en-US" sz="1600" b="1" dirty="0" smtClean="0">
+              <a:latin typeface="Consolas" panose="020B0609020204030204" pitchFamily="49" charset="0"/>
+              <a:cs typeface="Courier New" panose="02070309020205020404" pitchFamily="49" charset="0"/>
+            </a:endParaRPr>
+          </a:p>
+        </p:txBody>
+      </p:sp>
+      <p:sp>
+        <p:nvSpPr>
+          <p:cNvPr id="4" name="Rectangle 3"/>
+          <p:cNvSpPr/>
+          <p:nvPr/>
+        </p:nvSpPr>
+        <p:spPr>
+          <a:xfrm>
+            <a:off x="1397000" y="0"/>
+            <a:ext cx="6540500" cy="7658100"/>
+          </a:xfrm>
+          <a:prstGeom prst="rect">
+            <a:avLst/>
+          </a:prstGeom>
+          <a:noFill/>
+          <a:ln w="3175">
+            <a:solidFill>
+              <a:schemeClr val="tx1"/>
+            </a:solidFill>
+          </a:ln>
+        </p:spPr>
+        <p:style>
+          <a:lnRef idx="2">
+            <a:schemeClr val="accent1">
+              <a:shade val="50000"/>
+            </a:schemeClr>
+          </a:lnRef>
+          <a:fillRef idx="1">
+            <a:schemeClr val="accent1"/>
+          </a:fillRef>
+          <a:effectRef idx="0">
+            <a:schemeClr val="accent1"/>
+          </a:effectRef>
+          <a:fontRef idx="minor">
+            <a:schemeClr val="lt1"/>
+          </a:fontRef>
+        </p:style>
+        <p:txBody>
+          <a:bodyPr rtlCol="0" anchor="ctr"/>
+          <a:lstStyle/>
+          <a:p>
+            <a:pPr algn="ctr"/>
+            <a:endParaRPr lang="en-US"/>
           </a:p>
         </p:txBody>
       </p:sp>

</xml_diff>